<commit_message>
00-16 Compute Shader (PGW)
</commit_message>
<xml_diff>
--- a/Common/Chapter13 CS.pptx
+++ b/Common/Chapter13 CS.pptx
@@ -5,31 +5,32 @@
     <p:sldMasterId id="2147483648" r:id="rId1"/>
   </p:sldMasterIdLst>
   <p:notesMasterIdLst>
-    <p:notesMasterId r:id="rId21"/>
+    <p:notesMasterId r:id="rId22"/>
   </p:notesMasterIdLst>
   <p:handoutMasterIdLst>
-    <p:handoutMasterId r:id="rId22"/>
+    <p:handoutMasterId r:id="rId23"/>
   </p:handoutMasterIdLst>
   <p:sldIdLst>
     <p:sldId id="261" r:id="rId2"/>
     <p:sldId id="273" r:id="rId3"/>
     <p:sldId id="257" r:id="rId4"/>
     <p:sldId id="279" r:id="rId5"/>
-    <p:sldId id="266" r:id="rId6"/>
-    <p:sldId id="274" r:id="rId7"/>
-    <p:sldId id="275" r:id="rId8"/>
-    <p:sldId id="276" r:id="rId9"/>
-    <p:sldId id="277" r:id="rId10"/>
-    <p:sldId id="278" r:id="rId11"/>
-    <p:sldId id="262" r:id="rId12"/>
-    <p:sldId id="263" r:id="rId13"/>
-    <p:sldId id="264" r:id="rId14"/>
-    <p:sldId id="265" r:id="rId15"/>
-    <p:sldId id="271" r:id="rId16"/>
-    <p:sldId id="267" r:id="rId17"/>
-    <p:sldId id="268" r:id="rId18"/>
-    <p:sldId id="269" r:id="rId19"/>
-    <p:sldId id="270" r:id="rId20"/>
+    <p:sldId id="280" r:id="rId6"/>
+    <p:sldId id="266" r:id="rId7"/>
+    <p:sldId id="274" r:id="rId8"/>
+    <p:sldId id="275" r:id="rId9"/>
+    <p:sldId id="276" r:id="rId10"/>
+    <p:sldId id="277" r:id="rId11"/>
+    <p:sldId id="278" r:id="rId12"/>
+    <p:sldId id="262" r:id="rId13"/>
+    <p:sldId id="263" r:id="rId14"/>
+    <p:sldId id="264" r:id="rId15"/>
+    <p:sldId id="265" r:id="rId16"/>
+    <p:sldId id="271" r:id="rId17"/>
+    <p:sldId id="267" r:id="rId18"/>
+    <p:sldId id="268" r:id="rId19"/>
+    <p:sldId id="269" r:id="rId20"/>
+    <p:sldId id="270" r:id="rId21"/>
   </p:sldIdLst>
   <p:sldSz cx="12192000" cy="6858000"/>
   <p:notesSz cx="6858000" cy="9144000"/>
@@ -5059,7 +5060,7 @@
     </p:spTree>
     <p:extLst>
       <p:ext uri="{BB962C8B-B14F-4D97-AF65-F5344CB8AC3E}">
-        <p14:creationId xmlns:p14="http://schemas.microsoft.com/office/powerpoint/2010/main" val="2701920411"/>
+        <p14:creationId xmlns:p14="http://schemas.microsoft.com/office/powerpoint/2010/main" val="558176536"/>
       </p:ext>
     </p:extLst>
   </p:cSld>
@@ -5153,7 +5154,7 @@
     </p:spTree>
     <p:extLst>
       <p:ext uri="{BB962C8B-B14F-4D97-AF65-F5344CB8AC3E}">
-        <p14:creationId xmlns:p14="http://schemas.microsoft.com/office/powerpoint/2010/main" val="4200904051"/>
+        <p14:creationId xmlns:p14="http://schemas.microsoft.com/office/powerpoint/2010/main" val="2701920411"/>
       </p:ext>
     </p:extLst>
   </p:cSld>
@@ -5247,7 +5248,7 @@
     </p:spTree>
     <p:extLst>
       <p:ext uri="{BB962C8B-B14F-4D97-AF65-F5344CB8AC3E}">
-        <p14:creationId xmlns:p14="http://schemas.microsoft.com/office/powerpoint/2010/main" val="13273776"/>
+        <p14:creationId xmlns:p14="http://schemas.microsoft.com/office/powerpoint/2010/main" val="4200904051"/>
       </p:ext>
     </p:extLst>
   </p:cSld>
@@ -5341,7 +5342,7 @@
     </p:spTree>
     <p:extLst>
       <p:ext uri="{BB962C8B-B14F-4D97-AF65-F5344CB8AC3E}">
-        <p14:creationId xmlns:p14="http://schemas.microsoft.com/office/powerpoint/2010/main" val="395476298"/>
+        <p14:creationId xmlns:p14="http://schemas.microsoft.com/office/powerpoint/2010/main" val="13273776"/>
       </p:ext>
     </p:extLst>
   </p:cSld>
@@ -5435,7 +5436,7 @@
     </p:spTree>
     <p:extLst>
       <p:ext uri="{BB962C8B-B14F-4D97-AF65-F5344CB8AC3E}">
-        <p14:creationId xmlns:p14="http://schemas.microsoft.com/office/powerpoint/2010/main" val="2156841782"/>
+        <p14:creationId xmlns:p14="http://schemas.microsoft.com/office/powerpoint/2010/main" val="395476298"/>
       </p:ext>
     </p:extLst>
   </p:cSld>
@@ -5529,7 +5530,7 @@
     </p:spTree>
     <p:extLst>
       <p:ext uri="{BB962C8B-B14F-4D97-AF65-F5344CB8AC3E}">
-        <p14:creationId xmlns:p14="http://schemas.microsoft.com/office/powerpoint/2010/main" val="4126541837"/>
+        <p14:creationId xmlns:p14="http://schemas.microsoft.com/office/powerpoint/2010/main" val="2156841782"/>
       </p:ext>
     </p:extLst>
   </p:cSld>
@@ -5623,7 +5624,7 @@
     </p:spTree>
     <p:extLst>
       <p:ext uri="{BB962C8B-B14F-4D97-AF65-F5344CB8AC3E}">
-        <p14:creationId xmlns:p14="http://schemas.microsoft.com/office/powerpoint/2010/main" val="3453376837"/>
+        <p14:creationId xmlns:p14="http://schemas.microsoft.com/office/powerpoint/2010/main" val="4126541837"/>
       </p:ext>
     </p:extLst>
   </p:cSld>
@@ -5717,7 +5718,7 @@
     </p:spTree>
     <p:extLst>
       <p:ext uri="{BB962C8B-B14F-4D97-AF65-F5344CB8AC3E}">
-        <p14:creationId xmlns:p14="http://schemas.microsoft.com/office/powerpoint/2010/main" val="1355721338"/>
+        <p14:creationId xmlns:p14="http://schemas.microsoft.com/office/powerpoint/2010/main" val="3453376837"/>
       </p:ext>
     </p:extLst>
   </p:cSld>
@@ -5811,7 +5812,7 @@
     </p:spTree>
     <p:extLst>
       <p:ext uri="{BB962C8B-B14F-4D97-AF65-F5344CB8AC3E}">
-        <p14:creationId xmlns:p14="http://schemas.microsoft.com/office/powerpoint/2010/main" val="3219704989"/>
+        <p14:creationId xmlns:p14="http://schemas.microsoft.com/office/powerpoint/2010/main" val="1355721338"/>
       </p:ext>
     </p:extLst>
   </p:cSld>
@@ -5905,7 +5906,7 @@
     </p:spTree>
     <p:extLst>
       <p:ext uri="{BB962C8B-B14F-4D97-AF65-F5344CB8AC3E}">
-        <p14:creationId xmlns:p14="http://schemas.microsoft.com/office/powerpoint/2010/main" val="2938084464"/>
+        <p14:creationId xmlns:p14="http://schemas.microsoft.com/office/powerpoint/2010/main" val="3219704989"/>
       </p:ext>
     </p:extLst>
   </p:cSld>
@@ -6001,6 +6002,100 @@
     <p:extLst>
       <p:ext uri="{BB962C8B-B14F-4D97-AF65-F5344CB8AC3E}">
         <p14:creationId xmlns:p14="http://schemas.microsoft.com/office/powerpoint/2010/main" val="2316526102"/>
+      </p:ext>
+    </p:extLst>
+  </p:cSld>
+  <p:clrMapOvr>
+    <a:masterClrMapping/>
+  </p:clrMapOvr>
+</p:notes>
+</file>
+
+<file path=ppt/notesSlides/notesSlide20.xml><?xml version="1.0" encoding="utf-8"?>
+<p:notes xmlns:a="http://schemas.openxmlformats.org/drawingml/2006/main" xmlns:r="http://schemas.openxmlformats.org/officeDocument/2006/relationships" xmlns:p="http://schemas.openxmlformats.org/presentationml/2006/main">
+  <p:cSld>
+    <p:spTree>
+      <p:nvGrpSpPr>
+        <p:cNvPr id="1" name=""/>
+        <p:cNvGrpSpPr/>
+        <p:nvPr/>
+      </p:nvGrpSpPr>
+      <p:grpSpPr>
+        <a:xfrm>
+          <a:off x="0" y="0"/>
+          <a:ext cx="0" cy="0"/>
+          <a:chOff x="0" y="0"/>
+          <a:chExt cx="0" cy="0"/>
+        </a:xfrm>
+      </p:grpSpPr>
+      <p:sp>
+        <p:nvSpPr>
+          <p:cNvPr id="2" name="슬라이드 이미지 개체 틀 1"/>
+          <p:cNvSpPr>
+            <a:spLocks noGrp="1" noRot="1" noChangeAspect="1"/>
+          </p:cNvSpPr>
+          <p:nvPr>
+            <p:ph type="sldImg"/>
+          </p:nvPr>
+        </p:nvSpPr>
+        <p:spPr/>
+      </p:sp>
+      <p:sp>
+        <p:nvSpPr>
+          <p:cNvPr id="3" name="슬라이드 노트 개체 틀 2"/>
+          <p:cNvSpPr>
+            <a:spLocks noGrp="1"/>
+          </p:cNvSpPr>
+          <p:nvPr>
+            <p:ph type="body" idx="1"/>
+          </p:nvPr>
+        </p:nvSpPr>
+        <p:spPr/>
+        <p:txBody>
+          <a:bodyPr/>
+          <a:lstStyle/>
+          <a:p>
+            <a:endParaRPr lang="ko-KR" altLang="en-US" dirty="0">
+              <a:latin typeface="맑은 고딕" panose="020B0503020000020004" pitchFamily="50" charset="-127"/>
+              <a:ea typeface="맑은 고딕" panose="020B0503020000020004" pitchFamily="50" charset="-127"/>
+            </a:endParaRPr>
+          </a:p>
+        </p:txBody>
+      </p:sp>
+      <p:sp>
+        <p:nvSpPr>
+          <p:cNvPr id="4" name="슬라이드 번호 개체 틀 3"/>
+          <p:cNvSpPr>
+            <a:spLocks noGrp="1"/>
+          </p:cNvSpPr>
+          <p:nvPr>
+            <p:ph type="sldNum" sz="quarter" idx="10"/>
+          </p:nvPr>
+        </p:nvSpPr>
+        <p:spPr/>
+        <p:txBody>
+          <a:bodyPr/>
+          <a:lstStyle/>
+          <a:p>
+            <a:pPr rtl="0"/>
+            <a:fld id="{82869989-EB00-4EE7-BCB5-25BDC5BB29F8}" type="slidenum">
+              <a:rPr lang="en-US" altLang="ko-KR" smtClean="0">
+                <a:latin typeface="맑은 고딕" panose="020B0503020000020004" pitchFamily="50" charset="-127"/>
+                <a:ea typeface="맑은 고딕" panose="020B0503020000020004" pitchFamily="50" charset="-127"/>
+              </a:rPr>
+              <a:t>20</a:t>
+            </a:fld>
+            <a:endParaRPr lang="ko-KR" altLang="en-US" dirty="0">
+              <a:latin typeface="맑은 고딕" panose="020B0503020000020004" pitchFamily="50" charset="-127"/>
+              <a:ea typeface="맑은 고딕" panose="020B0503020000020004" pitchFamily="50" charset="-127"/>
+            </a:endParaRPr>
+          </a:p>
+        </p:txBody>
+      </p:sp>
+    </p:spTree>
+    <p:extLst>
+      <p:ext uri="{BB962C8B-B14F-4D97-AF65-F5344CB8AC3E}">
+        <p14:creationId xmlns:p14="http://schemas.microsoft.com/office/powerpoint/2010/main" val="2938084464"/>
       </p:ext>
     </p:extLst>
   </p:cSld>
@@ -6502,133 +6597,12 @@
         </p:nvSpPr>
         <p:spPr/>
         <p:txBody>
-          <a:bodyPr/>
+          <a:bodyPr rtlCol="0"/>
           <a:lstStyle/>
           <a:p>
-            <a:r>
-              <a:rPr lang="ko-KR" altLang="en-US">
-                <a:latin typeface="맑은 고딕" panose="020B0503020000020004" pitchFamily="50" charset="-127"/>
-                <a:ea typeface="맑은 고딕" panose="020B0503020000020004" pitchFamily="50" charset="-127"/>
-              </a:rPr>
-              <a:t>조명 사용시 정점 색상을 직접 지정하지 않는다</a:t>
-            </a:r>
-            <a:r>
-              <a:rPr lang="en-US" altLang="ko-KR">
-                <a:latin typeface="맑은 고딕" panose="020B0503020000020004" pitchFamily="50" charset="-127"/>
-                <a:ea typeface="맑은 고딕" panose="020B0503020000020004" pitchFamily="50" charset="-127"/>
-              </a:rPr>
-              <a:t>.</a:t>
-            </a:r>
-          </a:p>
-          <a:p>
-            <a:r>
-              <a:rPr lang="ko-KR" altLang="en-US">
-                <a:latin typeface="맑은 고딕" panose="020B0503020000020004" pitchFamily="50" charset="-127"/>
-                <a:ea typeface="맑은 고딕" panose="020B0503020000020004" pitchFamily="50" charset="-127"/>
-              </a:rPr>
-              <a:t>표면의 재질들과 표면에 비출 빛들을 지정하고 조명 방정식을 적용해서 정점 색상이 결정되게함</a:t>
-            </a:r>
-            <a:r>
-              <a:rPr lang="en-US" altLang="ko-KR">
-                <a:latin typeface="맑은 고딕" panose="020B0503020000020004" pitchFamily="50" charset="-127"/>
-                <a:ea typeface="맑은 고딕" panose="020B0503020000020004" pitchFamily="50" charset="-127"/>
-              </a:rPr>
-              <a:t>.</a:t>
-            </a:r>
-          </a:p>
-          <a:p>
-            <a:r>
-              <a:rPr lang="ko-KR" altLang="en-US">
-                <a:latin typeface="맑은 고딕" panose="020B0503020000020004" pitchFamily="50" charset="-127"/>
-                <a:ea typeface="맑은 고딕" panose="020B0503020000020004" pitchFamily="50" charset="-127"/>
-              </a:rPr>
-              <a:t>결론 적으로 물체의 색이 훨씬 더 사실적으로 나타남</a:t>
-            </a:r>
-            <a:r>
-              <a:rPr lang="en-US" altLang="ko-KR">
-                <a:latin typeface="맑은 고딕" panose="020B0503020000020004" pitchFamily="50" charset="-127"/>
-                <a:ea typeface="맑은 고딕" panose="020B0503020000020004" pitchFamily="50" charset="-127"/>
-              </a:rPr>
-              <a:t>.</a:t>
-            </a:r>
-          </a:p>
-          <a:p>
-            <a:endParaRPr lang="en-US" altLang="ko-KR">
-              <a:latin typeface="맑은 고딕" panose="020B0503020000020004" pitchFamily="50" charset="-127"/>
-              <a:ea typeface="맑은 고딕" panose="020B0503020000020004" pitchFamily="50" charset="-127"/>
-            </a:endParaRPr>
-          </a:p>
-          <a:p>
-            <a:r>
-              <a:rPr lang="ko-KR" altLang="en-US">
-                <a:latin typeface="맑은 고딕" panose="020B0503020000020004" pitchFamily="50" charset="-127"/>
-                <a:ea typeface="맑은 고딕" panose="020B0503020000020004" pitchFamily="50" charset="-127"/>
-              </a:rPr>
-              <a:t>재질의 속성 예 </a:t>
-            </a:r>
-            <a:r>
-              <a:rPr lang="en-US" altLang="ko-KR">
-                <a:latin typeface="맑은 고딕" panose="020B0503020000020004" pitchFamily="50" charset="-127"/>
-                <a:ea typeface="맑은 고딕" panose="020B0503020000020004" pitchFamily="50" charset="-127"/>
-              </a:rPr>
-              <a:t>: </a:t>
-            </a:r>
-            <a:r>
-              <a:rPr lang="ko-KR" altLang="en-US">
-                <a:latin typeface="맑은 고딕" panose="020B0503020000020004" pitchFamily="50" charset="-127"/>
-                <a:ea typeface="맑은 고딕" panose="020B0503020000020004" pitchFamily="50" charset="-127"/>
-              </a:rPr>
-              <a:t>표면이 반사</a:t>
-            </a:r>
-            <a:r>
-              <a:rPr lang="en-US" altLang="ko-KR">
-                <a:latin typeface="맑은 고딕" panose="020B0503020000020004" pitchFamily="50" charset="-127"/>
-                <a:ea typeface="맑은 고딕" panose="020B0503020000020004" pitchFamily="50" charset="-127"/>
-              </a:rPr>
-              <a:t>, </a:t>
-            </a:r>
-            <a:r>
-              <a:rPr lang="ko-KR" altLang="en-US">
-                <a:latin typeface="맑은 고딕" panose="020B0503020000020004" pitchFamily="50" charset="-127"/>
-                <a:ea typeface="맑은 고딕" panose="020B0503020000020004" pitchFamily="50" charset="-127"/>
-              </a:rPr>
-              <a:t>흡수하는 빛의 색상</a:t>
-            </a:r>
-            <a:r>
-              <a:rPr lang="en-US" altLang="ko-KR">
-                <a:latin typeface="맑은 고딕" panose="020B0503020000020004" pitchFamily="50" charset="-127"/>
-                <a:ea typeface="맑은 고딕" panose="020B0503020000020004" pitchFamily="50" charset="-127"/>
-              </a:rPr>
-              <a:t>, </a:t>
-            </a:r>
-            <a:r>
-              <a:rPr lang="ko-KR" altLang="en-US">
-                <a:latin typeface="맑은 고딕" panose="020B0503020000020004" pitchFamily="50" charset="-127"/>
-                <a:ea typeface="맑은 고딕" panose="020B0503020000020004" pitchFamily="50" charset="-127"/>
-              </a:rPr>
-              <a:t>표면 아래 재질의 굴절률</a:t>
-            </a:r>
-            <a:r>
-              <a:rPr lang="en-US" altLang="ko-KR">
-                <a:latin typeface="맑은 고딕" panose="020B0503020000020004" pitchFamily="50" charset="-127"/>
-                <a:ea typeface="맑은 고딕" panose="020B0503020000020004" pitchFamily="50" charset="-127"/>
-              </a:rPr>
-              <a:t>, </a:t>
-            </a:r>
-            <a:r>
-              <a:rPr lang="ko-KR" altLang="en-US">
-                <a:latin typeface="맑은 고딕" panose="020B0503020000020004" pitchFamily="50" charset="-127"/>
-                <a:ea typeface="맑은 고딕" panose="020B0503020000020004" pitchFamily="50" charset="-127"/>
-              </a:rPr>
-              <a:t>투명도 등</a:t>
-            </a:r>
-            <a:r>
-              <a:rPr lang="en-US" altLang="ko-KR">
-                <a:latin typeface="맑은 고딕" panose="020B0503020000020004" pitchFamily="50" charset="-127"/>
-                <a:ea typeface="맑은 고딕" panose="020B0503020000020004" pitchFamily="50" charset="-127"/>
-              </a:rPr>
-              <a:t>..</a:t>
-            </a:r>
+            <a:pPr marL="0" indent="0" rtl="0">
+              <a:buNone/>
+            </a:pPr>
             <a:endParaRPr lang="ko-KR" altLang="en-US" dirty="0">
               <a:latin typeface="맑은 고딕" panose="020B0503020000020004" pitchFamily="50" charset="-127"/>
               <a:ea typeface="맑은 고딕" panose="020B0503020000020004" pitchFamily="50" charset="-127"/>
@@ -6648,7 +6622,7 @@
         </p:nvSpPr>
         <p:spPr/>
         <p:txBody>
-          <a:bodyPr/>
+          <a:bodyPr rtlCol="0"/>
           <a:lstStyle/>
           <a:p>
             <a:pPr rtl="0"/>
@@ -6669,7 +6643,7 @@
     </p:spTree>
     <p:extLst>
       <p:ext uri="{BB962C8B-B14F-4D97-AF65-F5344CB8AC3E}">
-        <p14:creationId xmlns:p14="http://schemas.microsoft.com/office/powerpoint/2010/main" val="1214785384"/>
+        <p14:creationId xmlns:p14="http://schemas.microsoft.com/office/powerpoint/2010/main" val="3752052560"/>
       </p:ext>
     </p:extLst>
   </p:cSld>
@@ -6887,7 +6861,7 @@
     </p:spTree>
     <p:extLst>
       <p:ext uri="{BB962C8B-B14F-4D97-AF65-F5344CB8AC3E}">
-        <p14:creationId xmlns:p14="http://schemas.microsoft.com/office/powerpoint/2010/main" val="3192985994"/>
+        <p14:creationId xmlns:p14="http://schemas.microsoft.com/office/powerpoint/2010/main" val="1214785384"/>
       </p:ext>
     </p:extLst>
   </p:cSld>
@@ -6941,6 +6915,130 @@
           <a:bodyPr/>
           <a:lstStyle/>
           <a:p>
+            <a:r>
+              <a:rPr lang="ko-KR" altLang="en-US">
+                <a:latin typeface="맑은 고딕" panose="020B0503020000020004" pitchFamily="50" charset="-127"/>
+                <a:ea typeface="맑은 고딕" panose="020B0503020000020004" pitchFamily="50" charset="-127"/>
+              </a:rPr>
+              <a:t>조명 사용시 정점 색상을 직접 지정하지 않는다</a:t>
+            </a:r>
+            <a:r>
+              <a:rPr lang="en-US" altLang="ko-KR">
+                <a:latin typeface="맑은 고딕" panose="020B0503020000020004" pitchFamily="50" charset="-127"/>
+                <a:ea typeface="맑은 고딕" panose="020B0503020000020004" pitchFamily="50" charset="-127"/>
+              </a:rPr>
+              <a:t>.</a:t>
+            </a:r>
+          </a:p>
+          <a:p>
+            <a:r>
+              <a:rPr lang="ko-KR" altLang="en-US">
+                <a:latin typeface="맑은 고딕" panose="020B0503020000020004" pitchFamily="50" charset="-127"/>
+                <a:ea typeface="맑은 고딕" panose="020B0503020000020004" pitchFamily="50" charset="-127"/>
+              </a:rPr>
+              <a:t>표면의 재질들과 표면에 비출 빛들을 지정하고 조명 방정식을 적용해서 정점 색상이 결정되게함</a:t>
+            </a:r>
+            <a:r>
+              <a:rPr lang="en-US" altLang="ko-KR">
+                <a:latin typeface="맑은 고딕" panose="020B0503020000020004" pitchFamily="50" charset="-127"/>
+                <a:ea typeface="맑은 고딕" panose="020B0503020000020004" pitchFamily="50" charset="-127"/>
+              </a:rPr>
+              <a:t>.</a:t>
+            </a:r>
+          </a:p>
+          <a:p>
+            <a:r>
+              <a:rPr lang="ko-KR" altLang="en-US">
+                <a:latin typeface="맑은 고딕" panose="020B0503020000020004" pitchFamily="50" charset="-127"/>
+                <a:ea typeface="맑은 고딕" panose="020B0503020000020004" pitchFamily="50" charset="-127"/>
+              </a:rPr>
+              <a:t>결론 적으로 물체의 색이 훨씬 더 사실적으로 나타남</a:t>
+            </a:r>
+            <a:r>
+              <a:rPr lang="en-US" altLang="ko-KR">
+                <a:latin typeface="맑은 고딕" panose="020B0503020000020004" pitchFamily="50" charset="-127"/>
+                <a:ea typeface="맑은 고딕" panose="020B0503020000020004" pitchFamily="50" charset="-127"/>
+              </a:rPr>
+              <a:t>.</a:t>
+            </a:r>
+          </a:p>
+          <a:p>
+            <a:endParaRPr lang="en-US" altLang="ko-KR">
+              <a:latin typeface="맑은 고딕" panose="020B0503020000020004" pitchFamily="50" charset="-127"/>
+              <a:ea typeface="맑은 고딕" panose="020B0503020000020004" pitchFamily="50" charset="-127"/>
+            </a:endParaRPr>
+          </a:p>
+          <a:p>
+            <a:r>
+              <a:rPr lang="ko-KR" altLang="en-US">
+                <a:latin typeface="맑은 고딕" panose="020B0503020000020004" pitchFamily="50" charset="-127"/>
+                <a:ea typeface="맑은 고딕" panose="020B0503020000020004" pitchFamily="50" charset="-127"/>
+              </a:rPr>
+              <a:t>재질의 속성 예 </a:t>
+            </a:r>
+            <a:r>
+              <a:rPr lang="en-US" altLang="ko-KR">
+                <a:latin typeface="맑은 고딕" panose="020B0503020000020004" pitchFamily="50" charset="-127"/>
+                <a:ea typeface="맑은 고딕" panose="020B0503020000020004" pitchFamily="50" charset="-127"/>
+              </a:rPr>
+              <a:t>: </a:t>
+            </a:r>
+            <a:r>
+              <a:rPr lang="ko-KR" altLang="en-US">
+                <a:latin typeface="맑은 고딕" panose="020B0503020000020004" pitchFamily="50" charset="-127"/>
+                <a:ea typeface="맑은 고딕" panose="020B0503020000020004" pitchFamily="50" charset="-127"/>
+              </a:rPr>
+              <a:t>표면이 반사</a:t>
+            </a:r>
+            <a:r>
+              <a:rPr lang="en-US" altLang="ko-KR">
+                <a:latin typeface="맑은 고딕" panose="020B0503020000020004" pitchFamily="50" charset="-127"/>
+                <a:ea typeface="맑은 고딕" panose="020B0503020000020004" pitchFamily="50" charset="-127"/>
+              </a:rPr>
+              <a:t>, </a:t>
+            </a:r>
+            <a:r>
+              <a:rPr lang="ko-KR" altLang="en-US">
+                <a:latin typeface="맑은 고딕" panose="020B0503020000020004" pitchFamily="50" charset="-127"/>
+                <a:ea typeface="맑은 고딕" panose="020B0503020000020004" pitchFamily="50" charset="-127"/>
+              </a:rPr>
+              <a:t>흡수하는 빛의 색상</a:t>
+            </a:r>
+            <a:r>
+              <a:rPr lang="en-US" altLang="ko-KR">
+                <a:latin typeface="맑은 고딕" panose="020B0503020000020004" pitchFamily="50" charset="-127"/>
+                <a:ea typeface="맑은 고딕" panose="020B0503020000020004" pitchFamily="50" charset="-127"/>
+              </a:rPr>
+              <a:t>, </a:t>
+            </a:r>
+            <a:r>
+              <a:rPr lang="ko-KR" altLang="en-US">
+                <a:latin typeface="맑은 고딕" panose="020B0503020000020004" pitchFamily="50" charset="-127"/>
+                <a:ea typeface="맑은 고딕" panose="020B0503020000020004" pitchFamily="50" charset="-127"/>
+              </a:rPr>
+              <a:t>표면 아래 재질의 굴절률</a:t>
+            </a:r>
+            <a:r>
+              <a:rPr lang="en-US" altLang="ko-KR">
+                <a:latin typeface="맑은 고딕" panose="020B0503020000020004" pitchFamily="50" charset="-127"/>
+                <a:ea typeface="맑은 고딕" panose="020B0503020000020004" pitchFamily="50" charset="-127"/>
+              </a:rPr>
+              <a:t>, </a:t>
+            </a:r>
+            <a:r>
+              <a:rPr lang="ko-KR" altLang="en-US">
+                <a:latin typeface="맑은 고딕" panose="020B0503020000020004" pitchFamily="50" charset="-127"/>
+                <a:ea typeface="맑은 고딕" panose="020B0503020000020004" pitchFamily="50" charset="-127"/>
+              </a:rPr>
+              <a:t>투명도 등</a:t>
+            </a:r>
+            <a:r>
+              <a:rPr lang="en-US" altLang="ko-KR">
+                <a:latin typeface="맑은 고딕" panose="020B0503020000020004" pitchFamily="50" charset="-127"/>
+                <a:ea typeface="맑은 고딕" panose="020B0503020000020004" pitchFamily="50" charset="-127"/>
+              </a:rPr>
+              <a:t>..</a:t>
+            </a:r>
             <a:endParaRPr lang="ko-KR" altLang="en-US" dirty="0">
               <a:latin typeface="맑은 고딕" panose="020B0503020000020004" pitchFamily="50" charset="-127"/>
               <a:ea typeface="맑은 고딕" panose="020B0503020000020004" pitchFamily="50" charset="-127"/>
@@ -6981,7 +7079,7 @@
     </p:spTree>
     <p:extLst>
       <p:ext uri="{BB962C8B-B14F-4D97-AF65-F5344CB8AC3E}">
-        <p14:creationId xmlns:p14="http://schemas.microsoft.com/office/powerpoint/2010/main" val="544003928"/>
+        <p14:creationId xmlns:p14="http://schemas.microsoft.com/office/powerpoint/2010/main" val="3192985994"/>
       </p:ext>
     </p:extLst>
   </p:cSld>
@@ -7075,7 +7173,7 @@
     </p:spTree>
     <p:extLst>
       <p:ext uri="{BB962C8B-B14F-4D97-AF65-F5344CB8AC3E}">
-        <p14:creationId xmlns:p14="http://schemas.microsoft.com/office/powerpoint/2010/main" val="2802165901"/>
+        <p14:creationId xmlns:p14="http://schemas.microsoft.com/office/powerpoint/2010/main" val="544003928"/>
       </p:ext>
     </p:extLst>
   </p:cSld>
@@ -7169,7 +7267,7 @@
     </p:spTree>
     <p:extLst>
       <p:ext uri="{BB962C8B-B14F-4D97-AF65-F5344CB8AC3E}">
-        <p14:creationId xmlns:p14="http://schemas.microsoft.com/office/powerpoint/2010/main" val="558176536"/>
+        <p14:creationId xmlns:p14="http://schemas.microsoft.com/office/powerpoint/2010/main" val="2802165901"/>
       </p:ext>
     </p:extLst>
   </p:cSld>
@@ -22112,6 +22210,863 @@
           <a:p>
             <a:r>
               <a:rPr lang="ko-KR" altLang="en-US" sz="2000" dirty="0"/>
+              <a:t>텍스처 부분 자원</a:t>
+            </a:r>
+          </a:p>
+        </p:txBody>
+      </p:sp>
+      <p:sp>
+        <p:nvSpPr>
+          <p:cNvPr id="5" name="내용 개체 틀 2">
+            <a:extLst>
+              <a:ext uri="{FF2B5EF4-FFF2-40B4-BE49-F238E27FC236}">
+                <a16:creationId xmlns:a16="http://schemas.microsoft.com/office/drawing/2014/main" id="{BA012842-9CC9-4B8A-9F7E-1A1B7631FE14}"/>
+              </a:ext>
+            </a:extLst>
+          </p:cNvPr>
+          <p:cNvSpPr txBox="1">
+            <a:spLocks/>
+          </p:cNvSpPr>
+          <p:nvPr/>
+        </p:nvSpPr>
+        <p:spPr>
+          <a:xfrm>
+            <a:off x="972879" y="2107960"/>
+            <a:ext cx="6055241" cy="1209398"/>
+          </a:xfrm>
+          <a:prstGeom prst="rect">
+            <a:avLst/>
+          </a:prstGeom>
+        </p:spPr>
+        <p:txBody>
+          <a:bodyPr vert="horz" lIns="91440" tIns="45720" rIns="91440" bIns="45720" rtlCol="0">
+            <a:normAutofit/>
+          </a:bodyPr>
+          <a:lstStyle>
+            <a:lvl1pPr marL="228600" indent="-228600" algn="l" defTabSz="914400" rtl="0" eaLnBrk="1" latinLnBrk="1" hangingPunct="1">
+              <a:lnSpc>
+                <a:spcPct val="90000"/>
+              </a:lnSpc>
+              <a:spcBef>
+                <a:spcPts val="1800"/>
+              </a:spcBef>
+              <a:buClr>
+                <a:schemeClr val="accent1">
+                  <a:lumMod val="75000"/>
+                </a:schemeClr>
+              </a:buClr>
+              <a:buSzPct val="100000"/>
+              <a:buFont typeface="Arial" pitchFamily="34" charset="0"/>
+              <a:buChar char="▪"/>
+              <a:defRPr sz="2000" kern="1200">
+                <a:solidFill>
+                  <a:schemeClr val="tx1"/>
+                </a:solidFill>
+                <a:latin typeface="맑은 고딕" panose="020B0503020000020004" pitchFamily="50" charset="-127"/>
+                <a:ea typeface="맑은 고딕" panose="020B0503020000020004" pitchFamily="50" charset="-127"/>
+                <a:cs typeface="+mn-cs"/>
+              </a:defRPr>
+            </a:lvl1pPr>
+            <a:lvl2pPr marL="457200" indent="-182880" algn="l" defTabSz="914400" rtl="0" eaLnBrk="1" latinLnBrk="1" hangingPunct="1">
+              <a:lnSpc>
+                <a:spcPct val="90000"/>
+              </a:lnSpc>
+              <a:spcBef>
+                <a:spcPts val="1200"/>
+              </a:spcBef>
+              <a:buClr>
+                <a:schemeClr val="accent1">
+                  <a:lumMod val="75000"/>
+                </a:schemeClr>
+              </a:buClr>
+              <a:buSzPct val="100000"/>
+              <a:buFont typeface="Arial" pitchFamily="34" charset="0"/>
+              <a:buChar char="▪"/>
+              <a:defRPr sz="1800" kern="1200">
+                <a:solidFill>
+                  <a:schemeClr val="tx1"/>
+                </a:solidFill>
+                <a:latin typeface="맑은 고딕" panose="020B0503020000020004" pitchFamily="50" charset="-127"/>
+                <a:ea typeface="맑은 고딕" panose="020B0503020000020004" pitchFamily="50" charset="-127"/>
+                <a:cs typeface="+mn-cs"/>
+              </a:defRPr>
+            </a:lvl2pPr>
+            <a:lvl3pPr marL="685800" indent="-179388" algn="l" defTabSz="914400" rtl="0" eaLnBrk="1" latinLnBrk="1" hangingPunct="1">
+              <a:lnSpc>
+                <a:spcPct val="90000"/>
+              </a:lnSpc>
+              <a:spcBef>
+                <a:spcPts val="800"/>
+              </a:spcBef>
+              <a:buClr>
+                <a:schemeClr val="accent1">
+                  <a:lumMod val="75000"/>
+                </a:schemeClr>
+              </a:buClr>
+              <a:buSzPct val="100000"/>
+              <a:buFont typeface="Arial" pitchFamily="34" charset="0"/>
+              <a:buChar char="▪"/>
+              <a:defRPr sz="1600" kern="1200">
+                <a:solidFill>
+                  <a:schemeClr val="tx1"/>
+                </a:solidFill>
+                <a:latin typeface="맑은 고딕" panose="020B0503020000020004" pitchFamily="50" charset="-127"/>
+                <a:ea typeface="맑은 고딕" panose="020B0503020000020004" pitchFamily="50" charset="-127"/>
+                <a:cs typeface="+mn-cs"/>
+              </a:defRPr>
+            </a:lvl3pPr>
+            <a:lvl4pPr marL="914400" indent="-182880" algn="l" defTabSz="914400" rtl="0" eaLnBrk="1" latinLnBrk="1" hangingPunct="1">
+              <a:lnSpc>
+                <a:spcPct val="90000"/>
+              </a:lnSpc>
+              <a:spcBef>
+                <a:spcPts val="800"/>
+              </a:spcBef>
+              <a:buClr>
+                <a:schemeClr val="accent1">
+                  <a:lumMod val="75000"/>
+                </a:schemeClr>
+              </a:buClr>
+              <a:buSzPct val="100000"/>
+              <a:buFont typeface="Arial" pitchFamily="34" charset="0"/>
+              <a:buChar char="▪"/>
+              <a:defRPr sz="1400" kern="1200">
+                <a:solidFill>
+                  <a:schemeClr val="tx1"/>
+                </a:solidFill>
+                <a:latin typeface="맑은 고딕" panose="020B0503020000020004" pitchFamily="50" charset="-127"/>
+                <a:ea typeface="맑은 고딕" panose="020B0503020000020004" pitchFamily="50" charset="-127"/>
+                <a:cs typeface="+mn-cs"/>
+              </a:defRPr>
+            </a:lvl4pPr>
+            <a:lvl5pPr marL="1143000" indent="-179388" algn="l" defTabSz="914400" rtl="0" eaLnBrk="1" latinLnBrk="1" hangingPunct="1">
+              <a:lnSpc>
+                <a:spcPct val="90000"/>
+              </a:lnSpc>
+              <a:spcBef>
+                <a:spcPts val="600"/>
+              </a:spcBef>
+              <a:buClr>
+                <a:schemeClr val="accent1">
+                  <a:lumMod val="75000"/>
+                </a:schemeClr>
+              </a:buClr>
+              <a:buSzPct val="100000"/>
+              <a:buFont typeface="Arial" pitchFamily="34" charset="0"/>
+              <a:buChar char="▪"/>
+              <a:defRPr sz="1400" kern="1200">
+                <a:solidFill>
+                  <a:schemeClr val="tx1"/>
+                </a:solidFill>
+                <a:latin typeface="맑은 고딕" panose="020B0503020000020004" pitchFamily="50" charset="-127"/>
+                <a:ea typeface="맑은 고딕" panose="020B0503020000020004" pitchFamily="50" charset="-127"/>
+                <a:cs typeface="+mn-cs"/>
+              </a:defRPr>
+            </a:lvl5pPr>
+            <a:lvl6pPr marL="1371600" indent="-182880" algn="l" defTabSz="914400" rtl="0" eaLnBrk="1" latinLnBrk="1" hangingPunct="1">
+              <a:lnSpc>
+                <a:spcPct val="90000"/>
+              </a:lnSpc>
+              <a:spcBef>
+                <a:spcPts val="600"/>
+              </a:spcBef>
+              <a:buClr>
+                <a:schemeClr val="accent1">
+                  <a:lumMod val="75000"/>
+                </a:schemeClr>
+              </a:buClr>
+              <a:buSzPct val="100000"/>
+              <a:buFont typeface="Arial" pitchFamily="34" charset="0"/>
+              <a:buChar char="▪"/>
+              <a:defRPr sz="1800" kern="1200">
+                <a:solidFill>
+                  <a:schemeClr val="tx1"/>
+                </a:solidFill>
+                <a:latin typeface="+mn-lt"/>
+                <a:ea typeface="+mn-ea"/>
+                <a:cs typeface="+mn-cs"/>
+              </a:defRPr>
+            </a:lvl6pPr>
+            <a:lvl7pPr marL="1600200" indent="-179388" algn="l" defTabSz="914400" rtl="0" eaLnBrk="1" latinLnBrk="1" hangingPunct="1">
+              <a:lnSpc>
+                <a:spcPct val="90000"/>
+              </a:lnSpc>
+              <a:spcBef>
+                <a:spcPts val="600"/>
+              </a:spcBef>
+              <a:buClr>
+                <a:schemeClr val="accent1">
+                  <a:lumMod val="75000"/>
+                </a:schemeClr>
+              </a:buClr>
+              <a:buSzPct val="100000"/>
+              <a:buFont typeface="Arial" pitchFamily="34" charset="0"/>
+              <a:buChar char="▪"/>
+              <a:defRPr sz="1800" kern="1200">
+                <a:solidFill>
+                  <a:schemeClr val="tx1"/>
+                </a:solidFill>
+                <a:latin typeface="+mn-lt"/>
+                <a:ea typeface="+mn-ea"/>
+                <a:cs typeface="+mn-cs"/>
+              </a:defRPr>
+            </a:lvl7pPr>
+            <a:lvl8pPr marL="1828800" indent="-182880" algn="l" defTabSz="914400" rtl="0" eaLnBrk="1" latinLnBrk="1" hangingPunct="1">
+              <a:lnSpc>
+                <a:spcPct val="90000"/>
+              </a:lnSpc>
+              <a:spcBef>
+                <a:spcPts val="600"/>
+              </a:spcBef>
+              <a:buClr>
+                <a:schemeClr val="accent1">
+                  <a:lumMod val="75000"/>
+                </a:schemeClr>
+              </a:buClr>
+              <a:buSzPct val="100000"/>
+              <a:buFont typeface="Arial" pitchFamily="34" charset="0"/>
+              <a:buChar char="▪"/>
+              <a:defRPr sz="1800" kern="1200">
+                <a:solidFill>
+                  <a:schemeClr val="tx1"/>
+                </a:solidFill>
+                <a:latin typeface="+mn-lt"/>
+                <a:ea typeface="+mn-ea"/>
+                <a:cs typeface="+mn-cs"/>
+              </a:defRPr>
+            </a:lvl8pPr>
+            <a:lvl9pPr marL="1878012" indent="0" algn="l" defTabSz="914400" rtl="0" eaLnBrk="1" latinLnBrk="1" hangingPunct="1">
+              <a:lnSpc>
+                <a:spcPct val="90000"/>
+              </a:lnSpc>
+              <a:spcBef>
+                <a:spcPts val="600"/>
+              </a:spcBef>
+              <a:buClr>
+                <a:schemeClr val="accent1">
+                  <a:lumMod val="75000"/>
+                </a:schemeClr>
+              </a:buClr>
+              <a:buSzPct val="100000"/>
+              <a:buFont typeface="Arial" pitchFamily="34" charset="0"/>
+              <a:buNone/>
+              <a:defRPr sz="1800" kern="1200">
+                <a:solidFill>
+                  <a:schemeClr val="tx1"/>
+                </a:solidFill>
+                <a:latin typeface="+mn-lt"/>
+                <a:ea typeface="+mn-ea"/>
+                <a:cs typeface="+mn-cs"/>
+              </a:defRPr>
+            </a:lvl9pPr>
+          </a:lstStyle>
+          <a:p>
+            <a:pPr marL="0" indent="0">
+              <a:buFont typeface="Arial" pitchFamily="34" charset="0"/>
+              <a:buNone/>
+            </a:pPr>
+            <a:endParaRPr lang="ko-KR" altLang="en-US" sz="1500" dirty="0"/>
+          </a:p>
+        </p:txBody>
+      </p:sp>
+      <p:sp>
+        <p:nvSpPr>
+          <p:cNvPr id="9" name="내용 개체 틀 2">
+            <a:extLst>
+              <a:ext uri="{FF2B5EF4-FFF2-40B4-BE49-F238E27FC236}">
+                <a16:creationId xmlns:a16="http://schemas.microsoft.com/office/drawing/2014/main" id="{3C505D4B-DABB-454A-AC0F-60D099DDF5A8}"/>
+              </a:ext>
+            </a:extLst>
+          </p:cNvPr>
+          <p:cNvSpPr txBox="1">
+            <a:spLocks/>
+          </p:cNvSpPr>
+          <p:nvPr/>
+        </p:nvSpPr>
+        <p:spPr>
+          <a:xfrm>
+            <a:off x="739404" y="1783703"/>
+            <a:ext cx="9683603" cy="1725041"/>
+          </a:xfrm>
+          <a:prstGeom prst="rect">
+            <a:avLst/>
+          </a:prstGeom>
+        </p:spPr>
+        <p:txBody>
+          <a:bodyPr vert="horz" lIns="91440" tIns="45720" rIns="91440" bIns="45720" rtlCol="0">
+            <a:normAutofit/>
+          </a:bodyPr>
+          <a:lstStyle>
+            <a:lvl1pPr marL="228600" indent="-228600" algn="l" defTabSz="914400" rtl="0" eaLnBrk="1" latinLnBrk="1" hangingPunct="1">
+              <a:lnSpc>
+                <a:spcPct val="90000"/>
+              </a:lnSpc>
+              <a:spcBef>
+                <a:spcPts val="1800"/>
+              </a:spcBef>
+              <a:buClr>
+                <a:schemeClr val="accent1">
+                  <a:lumMod val="75000"/>
+                </a:schemeClr>
+              </a:buClr>
+              <a:buSzPct val="100000"/>
+              <a:buFont typeface="Arial" pitchFamily="34" charset="0"/>
+              <a:buChar char="▪"/>
+              <a:defRPr sz="2000" kern="1200">
+                <a:solidFill>
+                  <a:schemeClr val="tx1"/>
+                </a:solidFill>
+                <a:latin typeface="맑은 고딕" panose="020B0503020000020004" pitchFamily="50" charset="-127"/>
+                <a:ea typeface="맑은 고딕" panose="020B0503020000020004" pitchFamily="50" charset="-127"/>
+                <a:cs typeface="+mn-cs"/>
+              </a:defRPr>
+            </a:lvl1pPr>
+            <a:lvl2pPr marL="457200" indent="-182880" algn="l" defTabSz="914400" rtl="0" eaLnBrk="1" latinLnBrk="1" hangingPunct="1">
+              <a:lnSpc>
+                <a:spcPct val="90000"/>
+              </a:lnSpc>
+              <a:spcBef>
+                <a:spcPts val="1200"/>
+              </a:spcBef>
+              <a:buClr>
+                <a:schemeClr val="accent1">
+                  <a:lumMod val="75000"/>
+                </a:schemeClr>
+              </a:buClr>
+              <a:buSzPct val="100000"/>
+              <a:buFont typeface="Arial" pitchFamily="34" charset="0"/>
+              <a:buChar char="▪"/>
+              <a:defRPr sz="1800" kern="1200">
+                <a:solidFill>
+                  <a:schemeClr val="tx1"/>
+                </a:solidFill>
+                <a:latin typeface="맑은 고딕" panose="020B0503020000020004" pitchFamily="50" charset="-127"/>
+                <a:ea typeface="맑은 고딕" panose="020B0503020000020004" pitchFamily="50" charset="-127"/>
+                <a:cs typeface="+mn-cs"/>
+              </a:defRPr>
+            </a:lvl2pPr>
+            <a:lvl3pPr marL="685800" indent="-179388" algn="l" defTabSz="914400" rtl="0" eaLnBrk="1" latinLnBrk="1" hangingPunct="1">
+              <a:lnSpc>
+                <a:spcPct val="90000"/>
+              </a:lnSpc>
+              <a:spcBef>
+                <a:spcPts val="800"/>
+              </a:spcBef>
+              <a:buClr>
+                <a:schemeClr val="accent1">
+                  <a:lumMod val="75000"/>
+                </a:schemeClr>
+              </a:buClr>
+              <a:buSzPct val="100000"/>
+              <a:buFont typeface="Arial" pitchFamily="34" charset="0"/>
+              <a:buChar char="▪"/>
+              <a:defRPr sz="1600" kern="1200">
+                <a:solidFill>
+                  <a:schemeClr val="tx1"/>
+                </a:solidFill>
+                <a:latin typeface="맑은 고딕" panose="020B0503020000020004" pitchFamily="50" charset="-127"/>
+                <a:ea typeface="맑은 고딕" panose="020B0503020000020004" pitchFamily="50" charset="-127"/>
+                <a:cs typeface="+mn-cs"/>
+              </a:defRPr>
+            </a:lvl3pPr>
+            <a:lvl4pPr marL="914400" indent="-182880" algn="l" defTabSz="914400" rtl="0" eaLnBrk="1" latinLnBrk="1" hangingPunct="1">
+              <a:lnSpc>
+                <a:spcPct val="90000"/>
+              </a:lnSpc>
+              <a:spcBef>
+                <a:spcPts val="800"/>
+              </a:spcBef>
+              <a:buClr>
+                <a:schemeClr val="accent1">
+                  <a:lumMod val="75000"/>
+                </a:schemeClr>
+              </a:buClr>
+              <a:buSzPct val="100000"/>
+              <a:buFont typeface="Arial" pitchFamily="34" charset="0"/>
+              <a:buChar char="▪"/>
+              <a:defRPr sz="1400" kern="1200">
+                <a:solidFill>
+                  <a:schemeClr val="tx1"/>
+                </a:solidFill>
+                <a:latin typeface="맑은 고딕" panose="020B0503020000020004" pitchFamily="50" charset="-127"/>
+                <a:ea typeface="맑은 고딕" panose="020B0503020000020004" pitchFamily="50" charset="-127"/>
+                <a:cs typeface="+mn-cs"/>
+              </a:defRPr>
+            </a:lvl4pPr>
+            <a:lvl5pPr marL="1143000" indent="-179388" algn="l" defTabSz="914400" rtl="0" eaLnBrk="1" latinLnBrk="1" hangingPunct="1">
+              <a:lnSpc>
+                <a:spcPct val="90000"/>
+              </a:lnSpc>
+              <a:spcBef>
+                <a:spcPts val="600"/>
+              </a:spcBef>
+              <a:buClr>
+                <a:schemeClr val="accent1">
+                  <a:lumMod val="75000"/>
+                </a:schemeClr>
+              </a:buClr>
+              <a:buSzPct val="100000"/>
+              <a:buFont typeface="Arial" pitchFamily="34" charset="0"/>
+              <a:buChar char="▪"/>
+              <a:defRPr sz="1400" kern="1200">
+                <a:solidFill>
+                  <a:schemeClr val="tx1"/>
+                </a:solidFill>
+                <a:latin typeface="맑은 고딕" panose="020B0503020000020004" pitchFamily="50" charset="-127"/>
+                <a:ea typeface="맑은 고딕" panose="020B0503020000020004" pitchFamily="50" charset="-127"/>
+                <a:cs typeface="+mn-cs"/>
+              </a:defRPr>
+            </a:lvl5pPr>
+            <a:lvl6pPr marL="1371600" indent="-182880" algn="l" defTabSz="914400" rtl="0" eaLnBrk="1" latinLnBrk="1" hangingPunct="1">
+              <a:lnSpc>
+                <a:spcPct val="90000"/>
+              </a:lnSpc>
+              <a:spcBef>
+                <a:spcPts val="600"/>
+              </a:spcBef>
+              <a:buClr>
+                <a:schemeClr val="accent1">
+                  <a:lumMod val="75000"/>
+                </a:schemeClr>
+              </a:buClr>
+              <a:buSzPct val="100000"/>
+              <a:buFont typeface="Arial" pitchFamily="34" charset="0"/>
+              <a:buChar char="▪"/>
+              <a:defRPr sz="1800" kern="1200">
+                <a:solidFill>
+                  <a:schemeClr val="tx1"/>
+                </a:solidFill>
+                <a:latin typeface="+mn-lt"/>
+                <a:ea typeface="+mn-ea"/>
+                <a:cs typeface="+mn-cs"/>
+              </a:defRPr>
+            </a:lvl6pPr>
+            <a:lvl7pPr marL="1600200" indent="-179388" algn="l" defTabSz="914400" rtl="0" eaLnBrk="1" latinLnBrk="1" hangingPunct="1">
+              <a:lnSpc>
+                <a:spcPct val="90000"/>
+              </a:lnSpc>
+              <a:spcBef>
+                <a:spcPts val="600"/>
+              </a:spcBef>
+              <a:buClr>
+                <a:schemeClr val="accent1">
+                  <a:lumMod val="75000"/>
+                </a:schemeClr>
+              </a:buClr>
+              <a:buSzPct val="100000"/>
+              <a:buFont typeface="Arial" pitchFamily="34" charset="0"/>
+              <a:buChar char="▪"/>
+              <a:defRPr sz="1800" kern="1200">
+                <a:solidFill>
+                  <a:schemeClr val="tx1"/>
+                </a:solidFill>
+                <a:latin typeface="+mn-lt"/>
+                <a:ea typeface="+mn-ea"/>
+                <a:cs typeface="+mn-cs"/>
+              </a:defRPr>
+            </a:lvl7pPr>
+            <a:lvl8pPr marL="1828800" indent="-182880" algn="l" defTabSz="914400" rtl="0" eaLnBrk="1" latinLnBrk="1" hangingPunct="1">
+              <a:lnSpc>
+                <a:spcPct val="90000"/>
+              </a:lnSpc>
+              <a:spcBef>
+                <a:spcPts val="600"/>
+              </a:spcBef>
+              <a:buClr>
+                <a:schemeClr val="accent1">
+                  <a:lumMod val="75000"/>
+                </a:schemeClr>
+              </a:buClr>
+              <a:buSzPct val="100000"/>
+              <a:buFont typeface="Arial" pitchFamily="34" charset="0"/>
+              <a:buChar char="▪"/>
+              <a:defRPr sz="1800" kern="1200">
+                <a:solidFill>
+                  <a:schemeClr val="tx1"/>
+                </a:solidFill>
+                <a:latin typeface="+mn-lt"/>
+                <a:ea typeface="+mn-ea"/>
+                <a:cs typeface="+mn-cs"/>
+              </a:defRPr>
+            </a:lvl8pPr>
+            <a:lvl9pPr marL="1878012" indent="0" algn="l" defTabSz="914400" rtl="0" eaLnBrk="1" latinLnBrk="1" hangingPunct="1">
+              <a:lnSpc>
+                <a:spcPct val="90000"/>
+              </a:lnSpc>
+              <a:spcBef>
+                <a:spcPts val="600"/>
+              </a:spcBef>
+              <a:buClr>
+                <a:schemeClr val="accent1">
+                  <a:lumMod val="75000"/>
+                </a:schemeClr>
+              </a:buClr>
+              <a:buSzPct val="100000"/>
+              <a:buFont typeface="Arial" pitchFamily="34" charset="0"/>
+              <a:buNone/>
+              <a:defRPr sz="1800" kern="1200">
+                <a:solidFill>
+                  <a:schemeClr val="tx1"/>
+                </a:solidFill>
+                <a:latin typeface="+mn-lt"/>
+                <a:ea typeface="+mn-ea"/>
+                <a:cs typeface="+mn-cs"/>
+              </a:defRPr>
+            </a:lvl9pPr>
+          </a:lstStyle>
+          <a:p>
+            <a:pPr marL="0" indent="0">
+              <a:buFont typeface="Arial" pitchFamily="34" charset="0"/>
+              <a:buNone/>
+            </a:pPr>
+            <a:r>
+              <a:rPr lang="en-US" altLang="ko-KR" sz="1500" dirty="0"/>
+              <a:t>Direct3D API</a:t>
+            </a:r>
+            <a:r>
+              <a:rPr lang="ko-KR" altLang="en-US" sz="1500" dirty="0"/>
+              <a:t>에선 완전한 </a:t>
+            </a:r>
+            <a:r>
+              <a:rPr lang="ko-KR" altLang="en-US" sz="1500" dirty="0" err="1"/>
+              <a:t>밉맵</a:t>
+            </a:r>
+            <a:r>
+              <a:rPr lang="ko-KR" altLang="en-US" sz="1500" dirty="0"/>
+              <a:t> 사슬을 가진 하나의 텍스처를 </a:t>
+            </a:r>
+            <a:r>
+              <a:rPr lang="ko-KR" altLang="en-US" sz="1500" b="1" dirty="0"/>
+              <a:t>배열 조각</a:t>
+            </a:r>
+            <a:r>
+              <a:rPr lang="en-US" altLang="ko-KR" sz="1500" b="1" dirty="0"/>
+              <a:t>(array slice)</a:t>
+            </a:r>
+            <a:r>
+              <a:rPr lang="ko-KR" altLang="en-US" sz="1500" dirty="0"/>
+              <a:t>라 하고</a:t>
+            </a:r>
+            <a:r>
+              <a:rPr lang="en-US" altLang="ko-KR" sz="1500" dirty="0"/>
+              <a:t>, </a:t>
+            </a:r>
+            <a:r>
+              <a:rPr lang="ko-KR" altLang="en-US" sz="1500" dirty="0"/>
+              <a:t>텍스처 배열의 모든 텍스처의 </a:t>
+            </a:r>
+            <a:r>
+              <a:rPr lang="ko-KR" altLang="en-US" sz="1500" dirty="0" err="1"/>
+              <a:t>밉맵</a:t>
+            </a:r>
+            <a:r>
+              <a:rPr lang="ko-KR" altLang="en-US" sz="1500" dirty="0"/>
+              <a:t> 사슬 중 한 수준의 </a:t>
+            </a:r>
+            <a:r>
+              <a:rPr lang="ko-KR" altLang="en-US" sz="1500" dirty="0" err="1"/>
+              <a:t>밉맵들</a:t>
+            </a:r>
+            <a:r>
+              <a:rPr lang="ko-KR" altLang="en-US" sz="1500" dirty="0"/>
+              <a:t> 전체를 </a:t>
+            </a:r>
+            <a:r>
+              <a:rPr lang="ko-KR" altLang="en-US" sz="1500" b="1" dirty="0"/>
+              <a:t>밉 조각</a:t>
+            </a:r>
+            <a:r>
+              <a:rPr lang="en-US" altLang="ko-KR" sz="1500" b="1" dirty="0"/>
+              <a:t>(</a:t>
+            </a:r>
+            <a:r>
+              <a:rPr lang="en-US" altLang="ko-KR" sz="1500" b="1" dirty="0" err="1"/>
+              <a:t>mip</a:t>
+            </a:r>
+            <a:r>
+              <a:rPr lang="en-US" altLang="ko-KR" sz="1500" b="1" dirty="0"/>
+              <a:t> slice)</a:t>
+            </a:r>
+            <a:r>
+              <a:rPr lang="ko-KR" altLang="en-US" sz="1500" dirty="0"/>
+              <a:t>라 한다</a:t>
+            </a:r>
+            <a:r>
+              <a:rPr lang="en-US" altLang="ko-KR" sz="1500" dirty="0"/>
+              <a:t>.</a:t>
+            </a:r>
+          </a:p>
+          <a:p>
+            <a:pPr marL="0" indent="0">
+              <a:buFont typeface="Arial" pitchFamily="34" charset="0"/>
+              <a:buNone/>
+            </a:pPr>
+            <a:r>
+              <a:rPr lang="ko-KR" altLang="en-US" sz="1500" dirty="0"/>
+              <a:t>이 텍스처 배열의 한 원소의 특정 </a:t>
+            </a:r>
+            <a:r>
+              <a:rPr lang="ko-KR" altLang="en-US" sz="1500" dirty="0" err="1"/>
+              <a:t>밉맵</a:t>
+            </a:r>
+            <a:r>
+              <a:rPr lang="ko-KR" altLang="en-US" sz="1500" dirty="0"/>
+              <a:t> 수준 하나를 </a:t>
+            </a:r>
+            <a:r>
+              <a:rPr lang="ko-KR" altLang="en-US" sz="1500" b="1" dirty="0"/>
+              <a:t>부분 자원</a:t>
+            </a:r>
+            <a:r>
+              <a:rPr lang="en-US" altLang="ko-KR" sz="1500" b="1" dirty="0"/>
+              <a:t>(</a:t>
+            </a:r>
+            <a:r>
+              <a:rPr lang="en-US" altLang="ko-KR" sz="1500" b="1" dirty="0" err="1"/>
+              <a:t>subresource</a:t>
+            </a:r>
+            <a:r>
+              <a:rPr lang="en-US" altLang="ko-KR" sz="1500" b="1" dirty="0"/>
+              <a:t>)</a:t>
+            </a:r>
+            <a:r>
+              <a:rPr lang="ko-KR" altLang="en-US" sz="1500" dirty="0"/>
+              <a:t>이라 한다</a:t>
+            </a:r>
+            <a:r>
+              <a:rPr lang="en-US" altLang="ko-KR" sz="1500" dirty="0"/>
+              <a:t>.</a:t>
+            </a:r>
+          </a:p>
+          <a:p>
+            <a:pPr marL="0" indent="0">
+              <a:buFont typeface="Arial" pitchFamily="34" charset="0"/>
+              <a:buNone/>
+            </a:pPr>
+            <a:r>
+              <a:rPr lang="en-US" altLang="ko-KR" sz="1500" dirty="0"/>
+              <a:t>※ </a:t>
+            </a:r>
+            <a:r>
+              <a:rPr lang="ko-KR" altLang="en-US" sz="1500" dirty="0"/>
+              <a:t>하나의 선형적인</a:t>
+            </a:r>
+            <a:r>
+              <a:rPr lang="en-US" altLang="ko-KR" sz="1500" dirty="0"/>
+              <a:t>(1</a:t>
+            </a:r>
+            <a:r>
+              <a:rPr lang="ko-KR" altLang="en-US" sz="1500" dirty="0"/>
+              <a:t>차원</a:t>
+            </a:r>
+            <a:r>
+              <a:rPr lang="en-US" altLang="ko-KR" sz="1500" dirty="0"/>
+              <a:t>) </a:t>
+            </a:r>
+            <a:r>
+              <a:rPr lang="ko-KR" altLang="en-US" sz="1500" dirty="0"/>
+              <a:t>색인을 이용해 특정 부분자원에 접근하는 것도 가능 </a:t>
+            </a:r>
+            <a:r>
+              <a:rPr lang="en-US" altLang="ko-KR" sz="1500" dirty="0"/>
+              <a:t>(2</a:t>
+            </a:r>
+            <a:r>
+              <a:rPr lang="ko-KR" altLang="en-US" sz="1500" dirty="0"/>
+              <a:t>번째 그림</a:t>
+            </a:r>
+            <a:r>
+              <a:rPr lang="en-US" altLang="ko-KR" sz="1500" dirty="0"/>
+              <a:t>)</a:t>
+            </a:r>
+          </a:p>
+        </p:txBody>
+      </p:sp>
+      <p:pic>
+        <p:nvPicPr>
+          <p:cNvPr id="12" name="그림 11">
+            <a:extLst>
+              <a:ext uri="{FF2B5EF4-FFF2-40B4-BE49-F238E27FC236}">
+                <a16:creationId xmlns:a16="http://schemas.microsoft.com/office/drawing/2014/main" id="{02641323-CAC3-44AA-A208-2FB1CE6F82D7}"/>
+              </a:ext>
+            </a:extLst>
+          </p:cNvPr>
+          <p:cNvPicPr>
+            <a:picLocks noChangeAspect="1"/>
+          </p:cNvPicPr>
+          <p:nvPr/>
+        </p:nvPicPr>
+        <p:blipFill>
+          <a:blip r:embed="rId3"/>
+          <a:stretch>
+            <a:fillRect/>
+          </a:stretch>
+        </p:blipFill>
+        <p:spPr>
+          <a:xfrm>
+            <a:off x="696873" y="3417609"/>
+            <a:ext cx="3805365" cy="2618055"/>
+          </a:xfrm>
+          <a:prstGeom prst="rect">
+            <a:avLst/>
+          </a:prstGeom>
+        </p:spPr>
+      </p:pic>
+      <p:pic>
+        <p:nvPicPr>
+          <p:cNvPr id="14" name="그림 13">
+            <a:extLst>
+              <a:ext uri="{FF2B5EF4-FFF2-40B4-BE49-F238E27FC236}">
+                <a16:creationId xmlns:a16="http://schemas.microsoft.com/office/drawing/2014/main" id="{68ED1F3D-A146-47A5-9CEB-813A83DB5CE1}"/>
+              </a:ext>
+            </a:extLst>
+          </p:cNvPr>
+          <p:cNvPicPr>
+            <a:picLocks noChangeAspect="1"/>
+          </p:cNvPicPr>
+          <p:nvPr/>
+        </p:nvPicPr>
+        <p:blipFill>
+          <a:blip r:embed="rId4"/>
+          <a:stretch>
+            <a:fillRect/>
+          </a:stretch>
+        </p:blipFill>
+        <p:spPr>
+          <a:xfrm>
+            <a:off x="6053469" y="3573165"/>
+            <a:ext cx="4655488" cy="2213415"/>
+          </a:xfrm>
+          <a:prstGeom prst="rect">
+            <a:avLst/>
+          </a:prstGeom>
+        </p:spPr>
+      </p:pic>
+    </p:spTree>
+    <p:extLst>
+      <p:ext uri="{BB962C8B-B14F-4D97-AF65-F5344CB8AC3E}">
+        <p14:creationId xmlns:p14="http://schemas.microsoft.com/office/powerpoint/2010/main" val="967644129"/>
+      </p:ext>
+    </p:extLst>
+  </p:cSld>
+  <p:clrMapOvr>
+    <a:masterClrMapping/>
+  </p:clrMapOvr>
+  <mc:AlternateContent xmlns:mc="http://schemas.openxmlformats.org/markup-compatibility/2006" xmlns:p14="http://schemas.microsoft.com/office/powerpoint/2010/main">
+    <mc:Choice Requires="p14">
+      <p:transition spd="med" p14:dur="700">
+        <p:fade/>
+      </p:transition>
+    </mc:Choice>
+    <mc:Fallback xmlns="">
+      <p:transition spd="med">
+        <p:fade/>
+      </p:transition>
+    </mc:Fallback>
+  </mc:AlternateContent>
+</p:sld>
+</file>
+
+<file path=ppt/slides/slide11.xml><?xml version="1.0" encoding="utf-8"?>
+<p:sld xmlns:a="http://schemas.openxmlformats.org/drawingml/2006/main" xmlns:r="http://schemas.openxmlformats.org/officeDocument/2006/relationships" xmlns:p="http://schemas.openxmlformats.org/presentationml/2006/main">
+  <p:cSld>
+    <p:spTree>
+      <p:nvGrpSpPr>
+        <p:cNvPr id="1" name=""/>
+        <p:cNvGrpSpPr/>
+        <p:nvPr/>
+      </p:nvGrpSpPr>
+      <p:grpSpPr>
+        <a:xfrm>
+          <a:off x="0" y="0"/>
+          <a:ext cx="0" cy="0"/>
+          <a:chOff x="0" y="0"/>
+          <a:chExt cx="0" cy="0"/>
+        </a:xfrm>
+      </p:grpSpPr>
+      <p:sp>
+        <p:nvSpPr>
+          <p:cNvPr id="2" name="제목 1"/>
+          <p:cNvSpPr>
+            <a:spLocks noGrp="1"/>
+          </p:cNvSpPr>
+          <p:nvPr>
+            <p:ph type="title"/>
+          </p:nvPr>
+        </p:nvSpPr>
+        <p:spPr>
+          <a:xfrm>
+            <a:off x="1295400" y="494414"/>
+            <a:ext cx="9601200" cy="577666"/>
+          </a:xfrm>
+        </p:spPr>
+        <p:txBody>
+          <a:bodyPr rtlCol="0"/>
+          <a:lstStyle/>
+          <a:p>
+            <a:pPr rtl="0"/>
+            <a:r>
+              <a:rPr lang="en-US" altLang="ko-KR" dirty="0"/>
+              <a:t>2. Texture Array</a:t>
+            </a:r>
+            <a:endParaRPr lang="ko-KR" altLang="en-US" dirty="0">
+              <a:latin typeface="맑은 고딕" panose="020B0503020000020004" pitchFamily="50" charset="-127"/>
+              <a:ea typeface="맑은 고딕" panose="020B0503020000020004" pitchFamily="50" charset="-127"/>
+            </a:endParaRPr>
+          </a:p>
+        </p:txBody>
+      </p:sp>
+      <p:sp>
+        <p:nvSpPr>
+          <p:cNvPr id="4" name="제목 1">
+            <a:extLst>
+              <a:ext uri="{FF2B5EF4-FFF2-40B4-BE49-F238E27FC236}">
+                <a16:creationId xmlns:a16="http://schemas.microsoft.com/office/drawing/2014/main" id="{D92F99C4-4165-44A8-A569-E44734DB5A28}"/>
+              </a:ext>
+            </a:extLst>
+          </p:cNvPr>
+          <p:cNvSpPr txBox="1">
+            <a:spLocks/>
+          </p:cNvSpPr>
+          <p:nvPr/>
+        </p:nvSpPr>
+        <p:spPr>
+          <a:xfrm>
+            <a:off x="623777" y="984416"/>
+            <a:ext cx="9601200" cy="577666"/>
+          </a:xfrm>
+          <a:prstGeom prst="rect">
+            <a:avLst/>
+          </a:prstGeom>
+        </p:spPr>
+        <p:txBody>
+          <a:bodyPr vert="horz" lIns="91440" tIns="45720" rIns="91440" bIns="45720" rtlCol="0" anchor="b">
+            <a:normAutofit/>
+          </a:bodyPr>
+          <a:lstStyle>
+            <a:lvl1pPr algn="l" defTabSz="914400" rtl="0" eaLnBrk="1" latinLnBrk="1" hangingPunct="1">
+              <a:lnSpc>
+                <a:spcPct val="90000"/>
+              </a:lnSpc>
+              <a:spcBef>
+                <a:spcPct val="0"/>
+              </a:spcBef>
+              <a:buNone/>
+              <a:defRPr sz="3200" b="1" kern="1200">
+                <a:solidFill>
+                  <a:schemeClr val="accent1">
+                    <a:lumMod val="75000"/>
+                  </a:schemeClr>
+                </a:solidFill>
+                <a:latin typeface="맑은 고딕" panose="020B0503020000020004" pitchFamily="50" charset="-127"/>
+                <a:ea typeface="맑은 고딕" panose="020B0503020000020004" pitchFamily="50" charset="-127"/>
+                <a:cs typeface="+mj-cs"/>
+              </a:defRPr>
+            </a:lvl1pPr>
+          </a:lstStyle>
+          <a:p>
+            <a:r>
+              <a:rPr lang="ko-KR" altLang="en-US" sz="2000" dirty="0"/>
               <a:t>알파</a:t>
             </a:r>
             <a:r>
@@ -22791,7 +23746,7 @@
 </p:sld>
 </file>
 
-<file path=ppt/slides/slide11.xml><?xml version="1.0" encoding="utf-8"?>
+<file path=ppt/slides/slide12.xml><?xml version="1.0" encoding="utf-8"?>
 <p:sld xmlns:a="http://schemas.openxmlformats.org/drawingml/2006/main" xmlns:r="http://schemas.openxmlformats.org/officeDocument/2006/relationships" xmlns:p="http://schemas.openxmlformats.org/presentationml/2006/main">
   <p:cSld>
     <p:spTree>
@@ -22884,7 +23839,7 @@
 </p:sld>
 </file>
 
-<file path=ppt/slides/slide12.xml><?xml version="1.0" encoding="utf-8"?>
+<file path=ppt/slides/slide13.xml><?xml version="1.0" encoding="utf-8"?>
 <p:sld xmlns:a="http://schemas.openxmlformats.org/drawingml/2006/main" xmlns:r="http://schemas.openxmlformats.org/officeDocument/2006/relationships" xmlns:p="http://schemas.openxmlformats.org/presentationml/2006/main">
   <p:cSld>
     <p:spTree>
@@ -23370,7 +24325,7 @@
 </p:sld>
 </file>
 
-<file path=ppt/slides/slide13.xml><?xml version="1.0" encoding="utf-8"?>
+<file path=ppt/slides/slide14.xml><?xml version="1.0" encoding="utf-8"?>
 <p:sld xmlns:a="http://schemas.openxmlformats.org/drawingml/2006/main" xmlns:r="http://schemas.openxmlformats.org/officeDocument/2006/relationships" xmlns:p="http://schemas.openxmlformats.org/presentationml/2006/main">
   <p:cSld>
     <p:spTree>
@@ -23470,7 +24425,7 @@
 </p:sld>
 </file>
 
-<file path=ppt/slides/slide14.xml><?xml version="1.0" encoding="utf-8"?>
+<file path=ppt/slides/slide15.xml><?xml version="1.0" encoding="utf-8"?>
 <p:sld xmlns:a="http://schemas.openxmlformats.org/drawingml/2006/main" xmlns:r="http://schemas.openxmlformats.org/officeDocument/2006/relationships" xmlns:p="http://schemas.openxmlformats.org/presentationml/2006/main">
   <p:cSld>
     <p:spTree>
@@ -23568,7 +24523,7 @@
 </p:sld>
 </file>
 
-<file path=ppt/slides/slide15.xml><?xml version="1.0" encoding="utf-8"?>
+<file path=ppt/slides/slide16.xml><?xml version="1.0" encoding="utf-8"?>
 <p:sld xmlns:a="http://schemas.openxmlformats.org/drawingml/2006/main" xmlns:r="http://schemas.openxmlformats.org/officeDocument/2006/relationships" xmlns:p="http://schemas.openxmlformats.org/presentationml/2006/main">
   <p:cSld>
     <p:spTree>
@@ -23735,7 +24690,7 @@
 </p:sld>
 </file>
 
-<file path=ppt/slides/slide16.xml><?xml version="1.0" encoding="utf-8"?>
+<file path=ppt/slides/slide17.xml><?xml version="1.0" encoding="utf-8"?>
 <p:sld xmlns:a="http://schemas.openxmlformats.org/drawingml/2006/main" xmlns:r="http://schemas.openxmlformats.org/officeDocument/2006/relationships" xmlns:p="http://schemas.openxmlformats.org/presentationml/2006/main">
   <p:cSld>
     <p:spTree>
@@ -23810,7 +24765,7 @@
 </p:sld>
 </file>
 
-<file path=ppt/slides/slide17.xml><?xml version="1.0" encoding="utf-8"?>
+<file path=ppt/slides/slide18.xml><?xml version="1.0" encoding="utf-8"?>
 <p:sld xmlns:a="http://schemas.openxmlformats.org/drawingml/2006/main" xmlns:r="http://schemas.openxmlformats.org/officeDocument/2006/relationships" xmlns:p="http://schemas.openxmlformats.org/presentationml/2006/main">
   <p:cSld>
     <p:spTree>
@@ -23852,7 +24807,7 @@
 </p:sld>
 </file>
 
-<file path=ppt/slides/slide18.xml><?xml version="1.0" encoding="utf-8"?>
+<file path=ppt/slides/slide19.xml><?xml version="1.0" encoding="utf-8"?>
 <p:sld xmlns:a="http://schemas.openxmlformats.org/drawingml/2006/main" xmlns:r="http://schemas.openxmlformats.org/officeDocument/2006/relationships" xmlns:p="http://schemas.openxmlformats.org/presentationml/2006/main">
   <p:cSld>
     <p:spTree>
@@ -23973,7 +24928,204 @@
 </p:sld>
 </file>
 
-<file path=ppt/slides/slide19.xml><?xml version="1.0" encoding="utf-8"?>
+<file path=ppt/slides/slide2.xml><?xml version="1.0" encoding="utf-8"?>
+<p:sld xmlns:a="http://schemas.openxmlformats.org/drawingml/2006/main" xmlns:r="http://schemas.openxmlformats.org/officeDocument/2006/relationships" xmlns:p="http://schemas.openxmlformats.org/presentationml/2006/main">
+  <p:cSld>
+    <p:spTree>
+      <p:nvGrpSpPr>
+        <p:cNvPr id="1" name=""/>
+        <p:cNvGrpSpPr/>
+        <p:nvPr/>
+      </p:nvGrpSpPr>
+      <p:grpSpPr>
+        <a:xfrm>
+          <a:off x="0" y="0"/>
+          <a:ext cx="0" cy="0"/>
+          <a:chOff x="0" y="0"/>
+          <a:chExt cx="0" cy="0"/>
+        </a:xfrm>
+      </p:grpSpPr>
+      <p:sp>
+        <p:nvSpPr>
+          <p:cNvPr id="2" name="제목 1"/>
+          <p:cNvSpPr>
+            <a:spLocks noGrp="1"/>
+          </p:cNvSpPr>
+          <p:nvPr>
+            <p:ph type="title"/>
+          </p:nvPr>
+        </p:nvSpPr>
+        <p:spPr/>
+        <p:txBody>
+          <a:bodyPr rtlCol="0"/>
+          <a:lstStyle/>
+          <a:p>
+            <a:pPr rtl="0"/>
+            <a:r>
+              <a:rPr lang="ko-KR" altLang="en-US">
+                <a:latin typeface="맑은 고딕" panose="020B0503020000020004" pitchFamily="50" charset="-127"/>
+                <a:ea typeface="맑은 고딕" panose="020B0503020000020004" pitchFamily="50" charset="-127"/>
+              </a:rPr>
+              <a:t>목표</a:t>
+            </a:r>
+            <a:endParaRPr lang="ko-KR" altLang="en-US" dirty="0">
+              <a:latin typeface="맑은 고딕" panose="020B0503020000020004" pitchFamily="50" charset="-127"/>
+              <a:ea typeface="맑은 고딕" panose="020B0503020000020004" pitchFamily="50" charset="-127"/>
+            </a:endParaRPr>
+          </a:p>
+        </p:txBody>
+      </p:sp>
+      <p:sp>
+        <p:nvSpPr>
+          <p:cNvPr id="3" name="내용 개체 틀 2"/>
+          <p:cNvSpPr>
+            <a:spLocks noGrp="1"/>
+          </p:cNvSpPr>
+          <p:nvPr>
+            <p:ph idx="1"/>
+          </p:nvPr>
+        </p:nvSpPr>
+        <p:spPr/>
+        <p:txBody>
+          <a:bodyPr rtlCol="0"/>
+          <a:lstStyle/>
+          <a:p>
+            <a:pPr rtl="0"/>
+            <a:r>
+              <a:rPr lang="ko-KR" altLang="en-US" dirty="0" smtClean="0"/>
+              <a:t>계산 </a:t>
+            </a:r>
+            <a:r>
+              <a:rPr lang="ko-KR" altLang="en-US" dirty="0" err="1" smtClean="0"/>
+              <a:t>셰이더</a:t>
+            </a:r>
+            <a:r>
+              <a:rPr lang="ko-KR" altLang="en-US" dirty="0" smtClean="0"/>
+              <a:t> 프로그래밍 방법을 배운다</a:t>
+            </a:r>
+            <a:endParaRPr lang="en-US" altLang="ko-KR" dirty="0" smtClean="0"/>
+          </a:p>
+          <a:p>
+            <a:pPr rtl="0"/>
+            <a:r>
+              <a:rPr lang="ko-KR" altLang="en-US" dirty="0" smtClean="0"/>
+              <a:t>하드웨어가 스레드 그룹 및 그룹 안의 스레드들을 처리하는 방법을 개괄적으로 이해한다</a:t>
+            </a:r>
+            <a:endParaRPr lang="en-US" altLang="ko-KR" dirty="0" smtClean="0"/>
+          </a:p>
+          <a:p>
+            <a:pPr rtl="0"/>
+            <a:r>
+              <a:rPr lang="ko-KR" altLang="en-US" dirty="0" smtClean="0"/>
+              <a:t>계산 </a:t>
+            </a:r>
+            <a:r>
+              <a:rPr lang="ko-KR" altLang="en-US" dirty="0" err="1" smtClean="0"/>
+              <a:t>셰이더의</a:t>
+            </a:r>
+            <a:r>
+              <a:rPr lang="ko-KR" altLang="en-US" dirty="0" smtClean="0"/>
+              <a:t> 입력으로 설정할 수 있는 </a:t>
+            </a:r>
+            <a:r>
+              <a:rPr lang="en-US" altLang="ko-KR" dirty="0" smtClean="0"/>
+              <a:t>Direct3D </a:t>
+            </a:r>
+            <a:r>
+              <a:rPr lang="ko-KR" altLang="en-US" dirty="0" smtClean="0"/>
+              <a:t>자원의 종류와 계산 </a:t>
+            </a:r>
+            <a:r>
+              <a:rPr lang="ko-KR" altLang="en-US" dirty="0" err="1" smtClean="0"/>
+              <a:t>셰이더의</a:t>
+            </a:r>
+            <a:r>
+              <a:rPr lang="ko-KR" altLang="en-US" dirty="0" smtClean="0"/>
+              <a:t> 출력으로 설정할 수 있는 </a:t>
+            </a:r>
+            <a:r>
+              <a:rPr lang="en-US" altLang="ko-KR" dirty="0" smtClean="0"/>
+              <a:t>Direct3D </a:t>
+            </a:r>
+            <a:r>
+              <a:rPr lang="ko-KR" altLang="en-US" dirty="0" smtClean="0"/>
+              <a:t>자원의 종류를 파악한다</a:t>
+            </a:r>
+            <a:endParaRPr lang="en-US" altLang="ko-KR" dirty="0" smtClean="0"/>
+          </a:p>
+          <a:p>
+            <a:pPr rtl="0"/>
+            <a:r>
+              <a:rPr lang="ko-KR" altLang="en-US" dirty="0" smtClean="0"/>
+              <a:t>여러 종류의 스레드 </a:t>
+            </a:r>
+            <a:r>
+              <a:rPr lang="en-US" altLang="ko-KR" dirty="0" smtClean="0"/>
+              <a:t>ID</a:t>
+            </a:r>
+            <a:r>
+              <a:rPr lang="ko-KR" altLang="en-US" dirty="0" smtClean="0"/>
+              <a:t>와 그 용도를 이해한다</a:t>
+            </a:r>
+            <a:r>
+              <a:rPr lang="en-US" altLang="ko-KR" dirty="0" smtClean="0"/>
+              <a:t>.</a:t>
+            </a:r>
+          </a:p>
+          <a:p>
+            <a:pPr rtl="0"/>
+            <a:r>
+              <a:rPr lang="ko-KR" altLang="en-US" dirty="0" smtClean="0"/>
+              <a:t>공유 메모리가 무엇이고 성능 최적화에 어떻게 활용하는지 배운다</a:t>
+            </a:r>
+            <a:r>
+              <a:rPr lang="en-US" altLang="ko-KR" dirty="0" smtClean="0"/>
+              <a:t>.</a:t>
+            </a:r>
+          </a:p>
+          <a:p>
+            <a:pPr rtl="0"/>
+            <a:r>
+              <a:rPr lang="en-US" altLang="ko-KR" dirty="0" smtClean="0"/>
+              <a:t>GPGPU </a:t>
+            </a:r>
+            <a:r>
+              <a:rPr lang="ko-KR" altLang="en-US" dirty="0" smtClean="0"/>
+              <a:t>프로그래밍에 대한 좀더 자세한 정보를 얻을 수 있는 곳들을 살펴본다</a:t>
+            </a:r>
+            <a:r>
+              <a:rPr lang="en-US" altLang="ko-KR" dirty="0" smtClean="0"/>
+              <a:t>.</a:t>
+            </a:r>
+          </a:p>
+        </p:txBody>
+      </p:sp>
+    </p:spTree>
+    <p:extLst>
+      <p:ext uri="{BB962C8B-B14F-4D97-AF65-F5344CB8AC3E}">
+        <p14:creationId xmlns:p14="http://schemas.microsoft.com/office/powerpoint/2010/main" val="927977880"/>
+      </p:ext>
+    </p:extLst>
+  </p:cSld>
+  <p:clrMapOvr>
+    <a:masterClrMapping/>
+  </p:clrMapOvr>
+  <mc:AlternateContent xmlns:mc="http://schemas.openxmlformats.org/markup-compatibility/2006" xmlns:p14="http://schemas.microsoft.com/office/powerpoint/2010/main">
+    <mc:Choice Requires="p14">
+      <p:transition spd="med" p14:dur="700">
+        <p:fade/>
+      </p:transition>
+    </mc:Choice>
+    <mc:Fallback xmlns="">
+      <p:transition spd="med">
+        <p:fade/>
+      </p:transition>
+    </mc:Fallback>
+  </mc:AlternateContent>
+</p:sld>
+</file>
+
+<file path=ppt/slides/slide20.xml><?xml version="1.0" encoding="utf-8"?>
 <p:sld xmlns:a="http://schemas.openxmlformats.org/drawingml/2006/main" xmlns:r="http://schemas.openxmlformats.org/officeDocument/2006/relationships" xmlns:p="http://schemas.openxmlformats.org/presentationml/2006/main">
   <p:cSld>
     <p:spTree>
@@ -24083,203 +25235,6 @@
 </p:sld>
 </file>
 
-<file path=ppt/slides/slide2.xml><?xml version="1.0" encoding="utf-8"?>
-<p:sld xmlns:a="http://schemas.openxmlformats.org/drawingml/2006/main" xmlns:r="http://schemas.openxmlformats.org/officeDocument/2006/relationships" xmlns:p="http://schemas.openxmlformats.org/presentationml/2006/main">
-  <p:cSld>
-    <p:spTree>
-      <p:nvGrpSpPr>
-        <p:cNvPr id="1" name=""/>
-        <p:cNvGrpSpPr/>
-        <p:nvPr/>
-      </p:nvGrpSpPr>
-      <p:grpSpPr>
-        <a:xfrm>
-          <a:off x="0" y="0"/>
-          <a:ext cx="0" cy="0"/>
-          <a:chOff x="0" y="0"/>
-          <a:chExt cx="0" cy="0"/>
-        </a:xfrm>
-      </p:grpSpPr>
-      <p:sp>
-        <p:nvSpPr>
-          <p:cNvPr id="2" name="제목 1"/>
-          <p:cNvSpPr>
-            <a:spLocks noGrp="1"/>
-          </p:cNvSpPr>
-          <p:nvPr>
-            <p:ph type="title"/>
-          </p:nvPr>
-        </p:nvSpPr>
-        <p:spPr/>
-        <p:txBody>
-          <a:bodyPr rtlCol="0"/>
-          <a:lstStyle/>
-          <a:p>
-            <a:pPr rtl="0"/>
-            <a:r>
-              <a:rPr lang="ko-KR" altLang="en-US">
-                <a:latin typeface="맑은 고딕" panose="020B0503020000020004" pitchFamily="50" charset="-127"/>
-                <a:ea typeface="맑은 고딕" panose="020B0503020000020004" pitchFamily="50" charset="-127"/>
-              </a:rPr>
-              <a:t>목표</a:t>
-            </a:r>
-            <a:endParaRPr lang="ko-KR" altLang="en-US" dirty="0">
-              <a:latin typeface="맑은 고딕" panose="020B0503020000020004" pitchFamily="50" charset="-127"/>
-              <a:ea typeface="맑은 고딕" panose="020B0503020000020004" pitchFamily="50" charset="-127"/>
-            </a:endParaRPr>
-          </a:p>
-        </p:txBody>
-      </p:sp>
-      <p:sp>
-        <p:nvSpPr>
-          <p:cNvPr id="3" name="내용 개체 틀 2"/>
-          <p:cNvSpPr>
-            <a:spLocks noGrp="1"/>
-          </p:cNvSpPr>
-          <p:nvPr>
-            <p:ph idx="1"/>
-          </p:nvPr>
-        </p:nvSpPr>
-        <p:spPr/>
-        <p:txBody>
-          <a:bodyPr rtlCol="0"/>
-          <a:lstStyle/>
-          <a:p>
-            <a:pPr rtl="0"/>
-            <a:r>
-              <a:rPr lang="ko-KR" altLang="en-US" dirty="0" smtClean="0"/>
-              <a:t>계산 </a:t>
-            </a:r>
-            <a:r>
-              <a:rPr lang="ko-KR" altLang="en-US" dirty="0" err="1" smtClean="0"/>
-              <a:t>셰이더</a:t>
-            </a:r>
-            <a:r>
-              <a:rPr lang="ko-KR" altLang="en-US" dirty="0" smtClean="0"/>
-              <a:t> 프로그래밍 방법을 배운다</a:t>
-            </a:r>
-            <a:endParaRPr lang="en-US" altLang="ko-KR" dirty="0" smtClean="0"/>
-          </a:p>
-          <a:p>
-            <a:pPr rtl="0"/>
-            <a:r>
-              <a:rPr lang="ko-KR" altLang="en-US" dirty="0" smtClean="0"/>
-              <a:t>하드웨어가 스레드 그룹 및 그룹 안의 스레드들을 처리하는 방법을 개괄적으로 이해한다</a:t>
-            </a:r>
-            <a:endParaRPr lang="en-US" altLang="ko-KR" dirty="0" smtClean="0"/>
-          </a:p>
-          <a:p>
-            <a:pPr rtl="0"/>
-            <a:r>
-              <a:rPr lang="ko-KR" altLang="en-US" dirty="0" smtClean="0"/>
-              <a:t>계산 </a:t>
-            </a:r>
-            <a:r>
-              <a:rPr lang="ko-KR" altLang="en-US" dirty="0" err="1" smtClean="0"/>
-              <a:t>셰이더의</a:t>
-            </a:r>
-            <a:r>
-              <a:rPr lang="ko-KR" altLang="en-US" dirty="0" smtClean="0"/>
-              <a:t> 입력으로 설정할 수 있는 </a:t>
-            </a:r>
-            <a:r>
-              <a:rPr lang="en-US" altLang="ko-KR" dirty="0" smtClean="0"/>
-              <a:t>Direct3D </a:t>
-            </a:r>
-            <a:r>
-              <a:rPr lang="ko-KR" altLang="en-US" dirty="0" smtClean="0"/>
-              <a:t>자원의 종류와 계산 </a:t>
-            </a:r>
-            <a:r>
-              <a:rPr lang="ko-KR" altLang="en-US" dirty="0" err="1" smtClean="0"/>
-              <a:t>셰이더의</a:t>
-            </a:r>
-            <a:r>
-              <a:rPr lang="ko-KR" altLang="en-US" dirty="0" smtClean="0"/>
-              <a:t> 출력으로 설정할 수 있는 </a:t>
-            </a:r>
-            <a:r>
-              <a:rPr lang="en-US" altLang="ko-KR" dirty="0" smtClean="0"/>
-              <a:t>Direct3D </a:t>
-            </a:r>
-            <a:r>
-              <a:rPr lang="ko-KR" altLang="en-US" dirty="0" smtClean="0"/>
-              <a:t>자원의 종류를 파악한다</a:t>
-            </a:r>
-            <a:endParaRPr lang="en-US" altLang="ko-KR" dirty="0" smtClean="0"/>
-          </a:p>
-          <a:p>
-            <a:pPr rtl="0"/>
-            <a:r>
-              <a:rPr lang="ko-KR" altLang="en-US" dirty="0" smtClean="0"/>
-              <a:t>여러 종류의 스레드 </a:t>
-            </a:r>
-            <a:r>
-              <a:rPr lang="en-US" altLang="ko-KR" dirty="0" smtClean="0"/>
-              <a:t>ID</a:t>
-            </a:r>
-            <a:r>
-              <a:rPr lang="ko-KR" altLang="en-US" dirty="0" smtClean="0"/>
-              <a:t>와 그 용도를 이해한다</a:t>
-            </a:r>
-            <a:r>
-              <a:rPr lang="en-US" altLang="ko-KR" dirty="0" smtClean="0"/>
-              <a:t>.</a:t>
-            </a:r>
-          </a:p>
-          <a:p>
-            <a:pPr rtl="0"/>
-            <a:r>
-              <a:rPr lang="ko-KR" altLang="en-US" dirty="0" smtClean="0"/>
-              <a:t>공유 메모리가 무엇이고 성능 최적화에 어떻게 활용하는지 배운다</a:t>
-            </a:r>
-            <a:r>
-              <a:rPr lang="en-US" altLang="ko-KR" dirty="0" smtClean="0"/>
-              <a:t>.</a:t>
-            </a:r>
-          </a:p>
-          <a:p>
-            <a:pPr rtl="0"/>
-            <a:r>
-              <a:rPr lang="en-US" altLang="ko-KR" dirty="0" smtClean="0"/>
-              <a:t>GPGPU </a:t>
-            </a:r>
-            <a:r>
-              <a:rPr lang="ko-KR" altLang="en-US" dirty="0" smtClean="0"/>
-              <a:t>프로그래밍에 대한 좀더 자세한 정보를 얻을 수 있는 곳들을 살펴본다</a:t>
-            </a:r>
-            <a:r>
-              <a:rPr lang="en-US" altLang="ko-KR" dirty="0" smtClean="0"/>
-              <a:t>.</a:t>
-            </a:r>
-          </a:p>
-        </p:txBody>
-      </p:sp>
-    </p:spTree>
-    <p:extLst>
-      <p:ext uri="{BB962C8B-B14F-4D97-AF65-F5344CB8AC3E}">
-        <p14:creationId xmlns:p14="http://schemas.microsoft.com/office/powerpoint/2010/main" val="927977880"/>
-      </p:ext>
-    </p:extLst>
-  </p:cSld>
-  <p:clrMapOvr>
-    <a:masterClrMapping/>
-  </p:clrMapOvr>
-  <mc:AlternateContent xmlns:mc="http://schemas.openxmlformats.org/markup-compatibility/2006" xmlns:p14="http://schemas.microsoft.com/office/powerpoint/2010/main">
-    <mc:Choice Requires="p14">
-      <p:transition spd="med" p14:dur="700">
-        <p:fade/>
-      </p:transition>
-    </mc:Choice>
-    <mc:Fallback xmlns="">
-      <p:transition spd="med">
-        <p:fade/>
-      </p:transition>
-    </mc:Fallback>
-  </mc:AlternateContent>
-</p:sld>
-</file>
-
 <file path=ppt/slides/slide3.xml><?xml version="1.0" encoding="utf-8"?>
 <p:sld xmlns:a="http://schemas.openxmlformats.org/drawingml/2006/main" xmlns:r="http://schemas.openxmlformats.org/officeDocument/2006/relationships" xmlns:p="http://schemas.openxmlformats.org/presentationml/2006/main">
   <p:cSld>
@@ -24445,11 +25400,7 @@
             </a:r>
             <a:r>
               <a:rPr lang="ko-KR" altLang="en-US" dirty="0" smtClean="0"/>
-              <a:t>자운에 직접 자료를 </a:t>
-            </a:r>
-            <a:r>
-              <a:rPr lang="ko-KR" altLang="en-US" dirty="0" smtClean="0"/>
-              <a:t>기록 가능</a:t>
+              <a:t>자운에 직접 자료를 기록 가능</a:t>
             </a:r>
             <a:endParaRPr lang="en-US" altLang="ko-KR" dirty="0" smtClean="0"/>
           </a:p>
@@ -24765,6 +25716,238 @@
       </p:grpSpPr>
       <p:sp>
         <p:nvSpPr>
+          <p:cNvPr id="10" name="제목 1"/>
+          <p:cNvSpPr>
+            <a:spLocks noGrp="1"/>
+          </p:cNvSpPr>
+          <p:nvPr>
+            <p:ph type="title"/>
+          </p:nvPr>
+        </p:nvSpPr>
+        <p:spPr>
+          <a:xfrm>
+            <a:off x="1295400" y="189471"/>
+            <a:ext cx="9601200" cy="608270"/>
+          </a:xfrm>
+        </p:spPr>
+        <p:txBody>
+          <a:bodyPr rtlCol="0"/>
+          <a:lstStyle/>
+          <a:p>
+            <a:pPr rtl="0"/>
+            <a:r>
+              <a:rPr lang="en-US" altLang="ko-KR" dirty="0">
+                <a:latin typeface="맑은 고딕" panose="020B0503020000020004" pitchFamily="50" charset="-127"/>
+                <a:ea typeface="맑은 고딕" panose="020B0503020000020004" pitchFamily="50" charset="-127"/>
+              </a:rPr>
+              <a:t>1. </a:t>
+            </a:r>
+            <a:r>
+              <a:rPr lang="ko-KR" altLang="en-US" dirty="0" smtClean="0"/>
+              <a:t>스레드와 스레드 그룹</a:t>
+            </a:r>
+            <a:endParaRPr lang="en-US" altLang="ko-KR" dirty="0">
+              <a:latin typeface="맑은 고딕" panose="020B0503020000020004" pitchFamily="50" charset="-127"/>
+              <a:ea typeface="맑은 고딕" panose="020B0503020000020004" pitchFamily="50" charset="-127"/>
+            </a:endParaRPr>
+          </a:p>
+        </p:txBody>
+      </p:sp>
+      <p:pic>
+        <p:nvPicPr>
+          <p:cNvPr id="2" name="그림 1"/>
+          <p:cNvPicPr>
+            <a:picLocks noChangeAspect="1"/>
+          </p:cNvPicPr>
+          <p:nvPr/>
+        </p:nvPicPr>
+        <p:blipFill>
+          <a:blip r:embed="rId3">
+            <a:extLst>
+              <a:ext uri="{28A0092B-C50C-407E-A947-70E740481C1C}">
+                <a14:useLocalDpi xmlns:a14="http://schemas.microsoft.com/office/drawing/2010/main" val="0"/>
+              </a:ext>
+            </a:extLst>
+          </a:blip>
+          <a:stretch>
+            <a:fillRect/>
+          </a:stretch>
+        </p:blipFill>
+        <p:spPr>
+          <a:xfrm>
+            <a:off x="523877" y="1449978"/>
+            <a:ext cx="4795698" cy="3487780"/>
+          </a:xfrm>
+          <a:prstGeom prst="rect">
+            <a:avLst/>
+          </a:prstGeom>
+        </p:spPr>
+      </p:pic>
+      <p:sp>
+        <p:nvSpPr>
+          <p:cNvPr id="11" name="내용 개체 틀 2"/>
+          <p:cNvSpPr>
+            <a:spLocks noGrp="1"/>
+          </p:cNvSpPr>
+          <p:nvPr>
+            <p:ph sz="half" idx="1"/>
+          </p:nvPr>
+        </p:nvSpPr>
+        <p:spPr>
+          <a:xfrm>
+            <a:off x="5443210" y="1449978"/>
+            <a:ext cx="6234983" cy="3567223"/>
+          </a:xfrm>
+        </p:spPr>
+        <p:txBody>
+          <a:bodyPr rtlCol="0"/>
+          <a:lstStyle/>
+          <a:p>
+            <a:pPr rtl="0"/>
+            <a:r>
+              <a:rPr lang="en-US" altLang="ko-KR" dirty="0" smtClean="0"/>
+              <a:t>GPU</a:t>
+            </a:r>
+            <a:r>
+              <a:rPr lang="ko-KR" altLang="en-US" dirty="0" smtClean="0"/>
+              <a:t>프로그래밍에서는 다수의 스레드</a:t>
+            </a:r>
+            <a:r>
+              <a:rPr lang="en-US" altLang="ko-KR" dirty="0" smtClean="0">
+                <a:sym typeface="Wingdings" panose="05000000000000000000" pitchFamily="2" charset="2"/>
+              </a:rPr>
+              <a:t> </a:t>
+            </a:r>
+            <a:r>
+              <a:rPr lang="ko-KR" altLang="en-US" dirty="0" smtClean="0">
+                <a:sym typeface="Wingdings" panose="05000000000000000000" pitchFamily="2" charset="2"/>
+              </a:rPr>
+              <a:t>스레드 그룹</a:t>
+            </a:r>
+            <a:r>
+              <a:rPr lang="en-US" altLang="ko-KR" dirty="0" smtClean="0">
+                <a:sym typeface="Wingdings" panose="05000000000000000000" pitchFamily="2" charset="2"/>
+              </a:rPr>
+              <a:t>(thread group) -&gt; </a:t>
+            </a:r>
+            <a:r>
+              <a:rPr lang="ko-KR" altLang="en-US" dirty="0" smtClean="0">
+                <a:sym typeface="Wingdings" panose="05000000000000000000" pitchFamily="2" charset="2"/>
+              </a:rPr>
+              <a:t>하나의</a:t>
+            </a:r>
+            <a:r>
+              <a:rPr lang="en-US" altLang="ko-KR" dirty="0">
+                <a:sym typeface="Wingdings" panose="05000000000000000000" pitchFamily="2" charset="2"/>
+              </a:rPr>
+              <a:t> </a:t>
+            </a:r>
+            <a:r>
+              <a:rPr lang="ko-KR" altLang="en-US" dirty="0" smtClean="0">
+                <a:sym typeface="Wingdings" panose="05000000000000000000" pitchFamily="2" charset="2"/>
+              </a:rPr>
+              <a:t>격자</a:t>
+            </a:r>
+            <a:r>
+              <a:rPr lang="en-US" altLang="ko-KR" dirty="0" smtClean="0">
+                <a:sym typeface="Wingdings" panose="05000000000000000000" pitchFamily="2" charset="2"/>
+              </a:rPr>
+              <a:t>(grid)</a:t>
+            </a:r>
+            <a:r>
+              <a:rPr lang="ko-KR" altLang="en-US" dirty="0" smtClean="0">
+                <a:sym typeface="Wingdings" panose="05000000000000000000" pitchFamily="2" charset="2"/>
+              </a:rPr>
+              <a:t>를 형성</a:t>
+            </a:r>
+            <a:endParaRPr lang="en-US" altLang="ko-KR" dirty="0" smtClean="0">
+              <a:sym typeface="Wingdings" panose="05000000000000000000" pitchFamily="2" charset="2"/>
+            </a:endParaRPr>
+          </a:p>
+          <a:p>
+            <a:pPr rtl="0"/>
+            <a:endParaRPr lang="en-US" altLang="ko-KR" dirty="0">
+              <a:latin typeface="맑은 고딕" panose="020B0503020000020004" pitchFamily="50" charset="-127"/>
+              <a:ea typeface="맑은 고딕" panose="020B0503020000020004" pitchFamily="50" charset="-127"/>
+              <a:sym typeface="Wingdings" panose="05000000000000000000" pitchFamily="2" charset="2"/>
+            </a:endParaRPr>
+          </a:p>
+          <a:p>
+            <a:pPr rtl="0"/>
+            <a:r>
+              <a:rPr lang="ko-KR" altLang="en-US" dirty="0" smtClean="0">
+                <a:sym typeface="Wingdings" panose="05000000000000000000" pitchFamily="2" charset="2"/>
+              </a:rPr>
+              <a:t>각 스레드 그룹에는 그룹의 모든 스레드가 접근할 수 있는 공유 메모리가 주어진다</a:t>
+            </a:r>
+            <a:endParaRPr lang="en-US" altLang="ko-KR" dirty="0" smtClean="0">
+              <a:sym typeface="Wingdings" panose="05000000000000000000" pitchFamily="2" charset="2"/>
+            </a:endParaRPr>
+          </a:p>
+          <a:p>
+            <a:pPr lvl="1"/>
+            <a:r>
+              <a:rPr lang="ko-KR" altLang="en-US" dirty="0" smtClean="0">
+                <a:sym typeface="Wingdings" panose="05000000000000000000" pitchFamily="2" charset="2"/>
+              </a:rPr>
+              <a:t>자신이 속한 그룹이 아닌 다른 그룹의 공유 메모리는 </a:t>
+            </a:r>
+            <a:r>
+              <a:rPr lang="ko-KR" altLang="en-US" smtClean="0">
+                <a:sym typeface="Wingdings" panose="05000000000000000000" pitchFamily="2" charset="2"/>
+              </a:rPr>
+              <a:t>접근불가</a:t>
+            </a:r>
+            <a:endParaRPr lang="en-US" altLang="ko-KR" dirty="0" smtClean="0">
+              <a:sym typeface="Wingdings" panose="05000000000000000000" pitchFamily="2" charset="2"/>
+            </a:endParaRPr>
+          </a:p>
+        </p:txBody>
+      </p:sp>
+    </p:spTree>
+    <p:extLst>
+      <p:ext uri="{BB962C8B-B14F-4D97-AF65-F5344CB8AC3E}">
+        <p14:creationId xmlns:p14="http://schemas.microsoft.com/office/powerpoint/2010/main" val="2177878932"/>
+      </p:ext>
+    </p:extLst>
+  </p:cSld>
+  <p:clrMapOvr>
+    <a:masterClrMapping/>
+  </p:clrMapOvr>
+  <mc:AlternateContent xmlns:mc="http://schemas.openxmlformats.org/markup-compatibility/2006" xmlns:p14="http://schemas.microsoft.com/office/powerpoint/2010/main">
+    <mc:Choice Requires="p14">
+      <p:transition spd="med" p14:dur="700">
+        <p:fade/>
+      </p:transition>
+    </mc:Choice>
+    <mc:Fallback xmlns="">
+      <p:transition spd="med">
+        <p:fade/>
+      </p:transition>
+    </mc:Fallback>
+  </mc:AlternateContent>
+</p:sld>
+</file>
+
+<file path=ppt/slides/slide6.xml><?xml version="1.0" encoding="utf-8"?>
+<p:sld xmlns:a="http://schemas.openxmlformats.org/drawingml/2006/main" xmlns:r="http://schemas.openxmlformats.org/officeDocument/2006/relationships" xmlns:p="http://schemas.openxmlformats.org/presentationml/2006/main">
+  <p:cSld>
+    <p:spTree>
+      <p:nvGrpSpPr>
+        <p:cNvPr id="1" name=""/>
+        <p:cNvGrpSpPr/>
+        <p:nvPr/>
+      </p:nvGrpSpPr>
+      <p:grpSpPr>
+        <a:xfrm>
+          <a:off x="0" y="0"/>
+          <a:ext cx="0" cy="0"/>
+          <a:chOff x="0" y="0"/>
+          <a:chExt cx="0" cy="0"/>
+        </a:xfrm>
+      </p:grpSpPr>
+      <p:sp>
+        <p:nvSpPr>
           <p:cNvPr id="2" name="제목 1"/>
           <p:cNvSpPr>
             <a:spLocks noGrp="1"/>
@@ -25498,7 +26681,7 @@
 </p:sld>
 </file>
 
-<file path=ppt/slides/slide6.xml><?xml version="1.0" encoding="utf-8"?>
+<file path=ppt/slides/slide7.xml><?xml version="1.0" encoding="utf-8"?>
 <p:sld xmlns:a="http://schemas.openxmlformats.org/drawingml/2006/main" xmlns:r="http://schemas.openxmlformats.org/officeDocument/2006/relationships" xmlns:p="http://schemas.openxmlformats.org/presentationml/2006/main">
   <p:cSld>
     <p:spTree>
@@ -25973,7 +27156,7 @@
 </p:sld>
 </file>
 
-<file path=ppt/slides/slide7.xml><?xml version="1.0" encoding="utf-8"?>
+<file path=ppt/slides/slide8.xml><?xml version="1.0" encoding="utf-8"?>
 <p:sld xmlns:a="http://schemas.openxmlformats.org/drawingml/2006/main" xmlns:r="http://schemas.openxmlformats.org/officeDocument/2006/relationships" xmlns:p="http://schemas.openxmlformats.org/presentationml/2006/main">
   <p:cSld>
     <p:spTree>
@@ -26155,7 +27338,7 @@
 </p:sld>
 </file>
 
-<file path=ppt/slides/slide8.xml><?xml version="1.0" encoding="utf-8"?>
+<file path=ppt/slides/slide9.xml><?xml version="1.0" encoding="utf-8"?>
 <p:sld xmlns:a="http://schemas.openxmlformats.org/drawingml/2006/main" xmlns:r="http://schemas.openxmlformats.org/officeDocument/2006/relationships" xmlns:p="http://schemas.openxmlformats.org/presentationml/2006/main">
   <p:cSld>
     <p:spTree>
@@ -26956,863 +28139,6 @@
     <p:extLst>
       <p:ext uri="{BB962C8B-B14F-4D97-AF65-F5344CB8AC3E}">
         <p14:creationId xmlns:p14="http://schemas.microsoft.com/office/powerpoint/2010/main" val="2631182573"/>
-      </p:ext>
-    </p:extLst>
-  </p:cSld>
-  <p:clrMapOvr>
-    <a:masterClrMapping/>
-  </p:clrMapOvr>
-  <mc:AlternateContent xmlns:mc="http://schemas.openxmlformats.org/markup-compatibility/2006" xmlns:p14="http://schemas.microsoft.com/office/powerpoint/2010/main">
-    <mc:Choice Requires="p14">
-      <p:transition spd="med" p14:dur="700">
-        <p:fade/>
-      </p:transition>
-    </mc:Choice>
-    <mc:Fallback xmlns="">
-      <p:transition spd="med">
-        <p:fade/>
-      </p:transition>
-    </mc:Fallback>
-  </mc:AlternateContent>
-</p:sld>
-</file>
-
-<file path=ppt/slides/slide9.xml><?xml version="1.0" encoding="utf-8"?>
-<p:sld xmlns:a="http://schemas.openxmlformats.org/drawingml/2006/main" xmlns:r="http://schemas.openxmlformats.org/officeDocument/2006/relationships" xmlns:p="http://schemas.openxmlformats.org/presentationml/2006/main">
-  <p:cSld>
-    <p:spTree>
-      <p:nvGrpSpPr>
-        <p:cNvPr id="1" name=""/>
-        <p:cNvGrpSpPr/>
-        <p:nvPr/>
-      </p:nvGrpSpPr>
-      <p:grpSpPr>
-        <a:xfrm>
-          <a:off x="0" y="0"/>
-          <a:ext cx="0" cy="0"/>
-          <a:chOff x="0" y="0"/>
-          <a:chExt cx="0" cy="0"/>
-        </a:xfrm>
-      </p:grpSpPr>
-      <p:sp>
-        <p:nvSpPr>
-          <p:cNvPr id="2" name="제목 1"/>
-          <p:cNvSpPr>
-            <a:spLocks noGrp="1"/>
-          </p:cNvSpPr>
-          <p:nvPr>
-            <p:ph type="title"/>
-          </p:nvPr>
-        </p:nvSpPr>
-        <p:spPr>
-          <a:xfrm>
-            <a:off x="1295400" y="494414"/>
-            <a:ext cx="9601200" cy="577666"/>
-          </a:xfrm>
-        </p:spPr>
-        <p:txBody>
-          <a:bodyPr rtlCol="0"/>
-          <a:lstStyle/>
-          <a:p>
-            <a:pPr rtl="0"/>
-            <a:r>
-              <a:rPr lang="en-US" altLang="ko-KR" dirty="0"/>
-              <a:t>2. Texture Array</a:t>
-            </a:r>
-            <a:endParaRPr lang="ko-KR" altLang="en-US" dirty="0">
-              <a:latin typeface="맑은 고딕" panose="020B0503020000020004" pitchFamily="50" charset="-127"/>
-              <a:ea typeface="맑은 고딕" panose="020B0503020000020004" pitchFamily="50" charset="-127"/>
-            </a:endParaRPr>
-          </a:p>
-        </p:txBody>
-      </p:sp>
-      <p:sp>
-        <p:nvSpPr>
-          <p:cNvPr id="4" name="제목 1">
-            <a:extLst>
-              <a:ext uri="{FF2B5EF4-FFF2-40B4-BE49-F238E27FC236}">
-                <a16:creationId xmlns:a16="http://schemas.microsoft.com/office/drawing/2014/main" id="{D92F99C4-4165-44A8-A569-E44734DB5A28}"/>
-              </a:ext>
-            </a:extLst>
-          </p:cNvPr>
-          <p:cNvSpPr txBox="1">
-            <a:spLocks/>
-          </p:cNvSpPr>
-          <p:nvPr/>
-        </p:nvSpPr>
-        <p:spPr>
-          <a:xfrm>
-            <a:off x="623777" y="984416"/>
-            <a:ext cx="9601200" cy="577666"/>
-          </a:xfrm>
-          <a:prstGeom prst="rect">
-            <a:avLst/>
-          </a:prstGeom>
-        </p:spPr>
-        <p:txBody>
-          <a:bodyPr vert="horz" lIns="91440" tIns="45720" rIns="91440" bIns="45720" rtlCol="0" anchor="b">
-            <a:normAutofit/>
-          </a:bodyPr>
-          <a:lstStyle>
-            <a:lvl1pPr algn="l" defTabSz="914400" rtl="0" eaLnBrk="1" latinLnBrk="1" hangingPunct="1">
-              <a:lnSpc>
-                <a:spcPct val="90000"/>
-              </a:lnSpc>
-              <a:spcBef>
-                <a:spcPct val="0"/>
-              </a:spcBef>
-              <a:buNone/>
-              <a:defRPr sz="3200" b="1" kern="1200">
-                <a:solidFill>
-                  <a:schemeClr val="accent1">
-                    <a:lumMod val="75000"/>
-                  </a:schemeClr>
-                </a:solidFill>
-                <a:latin typeface="맑은 고딕" panose="020B0503020000020004" pitchFamily="50" charset="-127"/>
-                <a:ea typeface="맑은 고딕" panose="020B0503020000020004" pitchFamily="50" charset="-127"/>
-                <a:cs typeface="+mj-cs"/>
-              </a:defRPr>
-            </a:lvl1pPr>
-          </a:lstStyle>
-          <a:p>
-            <a:r>
-              <a:rPr lang="ko-KR" altLang="en-US" sz="2000" dirty="0"/>
-              <a:t>텍스처 부분 자원</a:t>
-            </a:r>
-          </a:p>
-        </p:txBody>
-      </p:sp>
-      <p:sp>
-        <p:nvSpPr>
-          <p:cNvPr id="5" name="내용 개체 틀 2">
-            <a:extLst>
-              <a:ext uri="{FF2B5EF4-FFF2-40B4-BE49-F238E27FC236}">
-                <a16:creationId xmlns:a16="http://schemas.microsoft.com/office/drawing/2014/main" id="{BA012842-9CC9-4B8A-9F7E-1A1B7631FE14}"/>
-              </a:ext>
-            </a:extLst>
-          </p:cNvPr>
-          <p:cNvSpPr txBox="1">
-            <a:spLocks/>
-          </p:cNvSpPr>
-          <p:nvPr/>
-        </p:nvSpPr>
-        <p:spPr>
-          <a:xfrm>
-            <a:off x="972879" y="2107960"/>
-            <a:ext cx="6055241" cy="1209398"/>
-          </a:xfrm>
-          <a:prstGeom prst="rect">
-            <a:avLst/>
-          </a:prstGeom>
-        </p:spPr>
-        <p:txBody>
-          <a:bodyPr vert="horz" lIns="91440" tIns="45720" rIns="91440" bIns="45720" rtlCol="0">
-            <a:normAutofit/>
-          </a:bodyPr>
-          <a:lstStyle>
-            <a:lvl1pPr marL="228600" indent="-228600" algn="l" defTabSz="914400" rtl="0" eaLnBrk="1" latinLnBrk="1" hangingPunct="1">
-              <a:lnSpc>
-                <a:spcPct val="90000"/>
-              </a:lnSpc>
-              <a:spcBef>
-                <a:spcPts val="1800"/>
-              </a:spcBef>
-              <a:buClr>
-                <a:schemeClr val="accent1">
-                  <a:lumMod val="75000"/>
-                </a:schemeClr>
-              </a:buClr>
-              <a:buSzPct val="100000"/>
-              <a:buFont typeface="Arial" pitchFamily="34" charset="0"/>
-              <a:buChar char="▪"/>
-              <a:defRPr sz="2000" kern="1200">
-                <a:solidFill>
-                  <a:schemeClr val="tx1"/>
-                </a:solidFill>
-                <a:latin typeface="맑은 고딕" panose="020B0503020000020004" pitchFamily="50" charset="-127"/>
-                <a:ea typeface="맑은 고딕" panose="020B0503020000020004" pitchFamily="50" charset="-127"/>
-                <a:cs typeface="+mn-cs"/>
-              </a:defRPr>
-            </a:lvl1pPr>
-            <a:lvl2pPr marL="457200" indent="-182880" algn="l" defTabSz="914400" rtl="0" eaLnBrk="1" latinLnBrk="1" hangingPunct="1">
-              <a:lnSpc>
-                <a:spcPct val="90000"/>
-              </a:lnSpc>
-              <a:spcBef>
-                <a:spcPts val="1200"/>
-              </a:spcBef>
-              <a:buClr>
-                <a:schemeClr val="accent1">
-                  <a:lumMod val="75000"/>
-                </a:schemeClr>
-              </a:buClr>
-              <a:buSzPct val="100000"/>
-              <a:buFont typeface="Arial" pitchFamily="34" charset="0"/>
-              <a:buChar char="▪"/>
-              <a:defRPr sz="1800" kern="1200">
-                <a:solidFill>
-                  <a:schemeClr val="tx1"/>
-                </a:solidFill>
-                <a:latin typeface="맑은 고딕" panose="020B0503020000020004" pitchFamily="50" charset="-127"/>
-                <a:ea typeface="맑은 고딕" panose="020B0503020000020004" pitchFamily="50" charset="-127"/>
-                <a:cs typeface="+mn-cs"/>
-              </a:defRPr>
-            </a:lvl2pPr>
-            <a:lvl3pPr marL="685800" indent="-179388" algn="l" defTabSz="914400" rtl="0" eaLnBrk="1" latinLnBrk="1" hangingPunct="1">
-              <a:lnSpc>
-                <a:spcPct val="90000"/>
-              </a:lnSpc>
-              <a:spcBef>
-                <a:spcPts val="800"/>
-              </a:spcBef>
-              <a:buClr>
-                <a:schemeClr val="accent1">
-                  <a:lumMod val="75000"/>
-                </a:schemeClr>
-              </a:buClr>
-              <a:buSzPct val="100000"/>
-              <a:buFont typeface="Arial" pitchFamily="34" charset="0"/>
-              <a:buChar char="▪"/>
-              <a:defRPr sz="1600" kern="1200">
-                <a:solidFill>
-                  <a:schemeClr val="tx1"/>
-                </a:solidFill>
-                <a:latin typeface="맑은 고딕" panose="020B0503020000020004" pitchFamily="50" charset="-127"/>
-                <a:ea typeface="맑은 고딕" panose="020B0503020000020004" pitchFamily="50" charset="-127"/>
-                <a:cs typeface="+mn-cs"/>
-              </a:defRPr>
-            </a:lvl3pPr>
-            <a:lvl4pPr marL="914400" indent="-182880" algn="l" defTabSz="914400" rtl="0" eaLnBrk="1" latinLnBrk="1" hangingPunct="1">
-              <a:lnSpc>
-                <a:spcPct val="90000"/>
-              </a:lnSpc>
-              <a:spcBef>
-                <a:spcPts val="800"/>
-              </a:spcBef>
-              <a:buClr>
-                <a:schemeClr val="accent1">
-                  <a:lumMod val="75000"/>
-                </a:schemeClr>
-              </a:buClr>
-              <a:buSzPct val="100000"/>
-              <a:buFont typeface="Arial" pitchFamily="34" charset="0"/>
-              <a:buChar char="▪"/>
-              <a:defRPr sz="1400" kern="1200">
-                <a:solidFill>
-                  <a:schemeClr val="tx1"/>
-                </a:solidFill>
-                <a:latin typeface="맑은 고딕" panose="020B0503020000020004" pitchFamily="50" charset="-127"/>
-                <a:ea typeface="맑은 고딕" panose="020B0503020000020004" pitchFamily="50" charset="-127"/>
-                <a:cs typeface="+mn-cs"/>
-              </a:defRPr>
-            </a:lvl4pPr>
-            <a:lvl5pPr marL="1143000" indent="-179388" algn="l" defTabSz="914400" rtl="0" eaLnBrk="1" latinLnBrk="1" hangingPunct="1">
-              <a:lnSpc>
-                <a:spcPct val="90000"/>
-              </a:lnSpc>
-              <a:spcBef>
-                <a:spcPts val="600"/>
-              </a:spcBef>
-              <a:buClr>
-                <a:schemeClr val="accent1">
-                  <a:lumMod val="75000"/>
-                </a:schemeClr>
-              </a:buClr>
-              <a:buSzPct val="100000"/>
-              <a:buFont typeface="Arial" pitchFamily="34" charset="0"/>
-              <a:buChar char="▪"/>
-              <a:defRPr sz="1400" kern="1200">
-                <a:solidFill>
-                  <a:schemeClr val="tx1"/>
-                </a:solidFill>
-                <a:latin typeface="맑은 고딕" panose="020B0503020000020004" pitchFamily="50" charset="-127"/>
-                <a:ea typeface="맑은 고딕" panose="020B0503020000020004" pitchFamily="50" charset="-127"/>
-                <a:cs typeface="+mn-cs"/>
-              </a:defRPr>
-            </a:lvl5pPr>
-            <a:lvl6pPr marL="1371600" indent="-182880" algn="l" defTabSz="914400" rtl="0" eaLnBrk="1" latinLnBrk="1" hangingPunct="1">
-              <a:lnSpc>
-                <a:spcPct val="90000"/>
-              </a:lnSpc>
-              <a:spcBef>
-                <a:spcPts val="600"/>
-              </a:spcBef>
-              <a:buClr>
-                <a:schemeClr val="accent1">
-                  <a:lumMod val="75000"/>
-                </a:schemeClr>
-              </a:buClr>
-              <a:buSzPct val="100000"/>
-              <a:buFont typeface="Arial" pitchFamily="34" charset="0"/>
-              <a:buChar char="▪"/>
-              <a:defRPr sz="1800" kern="1200">
-                <a:solidFill>
-                  <a:schemeClr val="tx1"/>
-                </a:solidFill>
-                <a:latin typeface="+mn-lt"/>
-                <a:ea typeface="+mn-ea"/>
-                <a:cs typeface="+mn-cs"/>
-              </a:defRPr>
-            </a:lvl6pPr>
-            <a:lvl7pPr marL="1600200" indent="-179388" algn="l" defTabSz="914400" rtl="0" eaLnBrk="1" latinLnBrk="1" hangingPunct="1">
-              <a:lnSpc>
-                <a:spcPct val="90000"/>
-              </a:lnSpc>
-              <a:spcBef>
-                <a:spcPts val="600"/>
-              </a:spcBef>
-              <a:buClr>
-                <a:schemeClr val="accent1">
-                  <a:lumMod val="75000"/>
-                </a:schemeClr>
-              </a:buClr>
-              <a:buSzPct val="100000"/>
-              <a:buFont typeface="Arial" pitchFamily="34" charset="0"/>
-              <a:buChar char="▪"/>
-              <a:defRPr sz="1800" kern="1200">
-                <a:solidFill>
-                  <a:schemeClr val="tx1"/>
-                </a:solidFill>
-                <a:latin typeface="+mn-lt"/>
-                <a:ea typeface="+mn-ea"/>
-                <a:cs typeface="+mn-cs"/>
-              </a:defRPr>
-            </a:lvl7pPr>
-            <a:lvl8pPr marL="1828800" indent="-182880" algn="l" defTabSz="914400" rtl="0" eaLnBrk="1" latinLnBrk="1" hangingPunct="1">
-              <a:lnSpc>
-                <a:spcPct val="90000"/>
-              </a:lnSpc>
-              <a:spcBef>
-                <a:spcPts val="600"/>
-              </a:spcBef>
-              <a:buClr>
-                <a:schemeClr val="accent1">
-                  <a:lumMod val="75000"/>
-                </a:schemeClr>
-              </a:buClr>
-              <a:buSzPct val="100000"/>
-              <a:buFont typeface="Arial" pitchFamily="34" charset="0"/>
-              <a:buChar char="▪"/>
-              <a:defRPr sz="1800" kern="1200">
-                <a:solidFill>
-                  <a:schemeClr val="tx1"/>
-                </a:solidFill>
-                <a:latin typeface="+mn-lt"/>
-                <a:ea typeface="+mn-ea"/>
-                <a:cs typeface="+mn-cs"/>
-              </a:defRPr>
-            </a:lvl8pPr>
-            <a:lvl9pPr marL="1878012" indent="0" algn="l" defTabSz="914400" rtl="0" eaLnBrk="1" latinLnBrk="1" hangingPunct="1">
-              <a:lnSpc>
-                <a:spcPct val="90000"/>
-              </a:lnSpc>
-              <a:spcBef>
-                <a:spcPts val="600"/>
-              </a:spcBef>
-              <a:buClr>
-                <a:schemeClr val="accent1">
-                  <a:lumMod val="75000"/>
-                </a:schemeClr>
-              </a:buClr>
-              <a:buSzPct val="100000"/>
-              <a:buFont typeface="Arial" pitchFamily="34" charset="0"/>
-              <a:buNone/>
-              <a:defRPr sz="1800" kern="1200">
-                <a:solidFill>
-                  <a:schemeClr val="tx1"/>
-                </a:solidFill>
-                <a:latin typeface="+mn-lt"/>
-                <a:ea typeface="+mn-ea"/>
-                <a:cs typeface="+mn-cs"/>
-              </a:defRPr>
-            </a:lvl9pPr>
-          </a:lstStyle>
-          <a:p>
-            <a:pPr marL="0" indent="0">
-              <a:buFont typeface="Arial" pitchFamily="34" charset="0"/>
-              <a:buNone/>
-            </a:pPr>
-            <a:endParaRPr lang="ko-KR" altLang="en-US" sz="1500" dirty="0"/>
-          </a:p>
-        </p:txBody>
-      </p:sp>
-      <p:sp>
-        <p:nvSpPr>
-          <p:cNvPr id="9" name="내용 개체 틀 2">
-            <a:extLst>
-              <a:ext uri="{FF2B5EF4-FFF2-40B4-BE49-F238E27FC236}">
-                <a16:creationId xmlns:a16="http://schemas.microsoft.com/office/drawing/2014/main" id="{3C505D4B-DABB-454A-AC0F-60D099DDF5A8}"/>
-              </a:ext>
-            </a:extLst>
-          </p:cNvPr>
-          <p:cNvSpPr txBox="1">
-            <a:spLocks/>
-          </p:cNvSpPr>
-          <p:nvPr/>
-        </p:nvSpPr>
-        <p:spPr>
-          <a:xfrm>
-            <a:off x="739404" y="1783703"/>
-            <a:ext cx="9683603" cy="1725041"/>
-          </a:xfrm>
-          <a:prstGeom prst="rect">
-            <a:avLst/>
-          </a:prstGeom>
-        </p:spPr>
-        <p:txBody>
-          <a:bodyPr vert="horz" lIns="91440" tIns="45720" rIns="91440" bIns="45720" rtlCol="0">
-            <a:normAutofit/>
-          </a:bodyPr>
-          <a:lstStyle>
-            <a:lvl1pPr marL="228600" indent="-228600" algn="l" defTabSz="914400" rtl="0" eaLnBrk="1" latinLnBrk="1" hangingPunct="1">
-              <a:lnSpc>
-                <a:spcPct val="90000"/>
-              </a:lnSpc>
-              <a:spcBef>
-                <a:spcPts val="1800"/>
-              </a:spcBef>
-              <a:buClr>
-                <a:schemeClr val="accent1">
-                  <a:lumMod val="75000"/>
-                </a:schemeClr>
-              </a:buClr>
-              <a:buSzPct val="100000"/>
-              <a:buFont typeface="Arial" pitchFamily="34" charset="0"/>
-              <a:buChar char="▪"/>
-              <a:defRPr sz="2000" kern="1200">
-                <a:solidFill>
-                  <a:schemeClr val="tx1"/>
-                </a:solidFill>
-                <a:latin typeface="맑은 고딕" panose="020B0503020000020004" pitchFamily="50" charset="-127"/>
-                <a:ea typeface="맑은 고딕" panose="020B0503020000020004" pitchFamily="50" charset="-127"/>
-                <a:cs typeface="+mn-cs"/>
-              </a:defRPr>
-            </a:lvl1pPr>
-            <a:lvl2pPr marL="457200" indent="-182880" algn="l" defTabSz="914400" rtl="0" eaLnBrk="1" latinLnBrk="1" hangingPunct="1">
-              <a:lnSpc>
-                <a:spcPct val="90000"/>
-              </a:lnSpc>
-              <a:spcBef>
-                <a:spcPts val="1200"/>
-              </a:spcBef>
-              <a:buClr>
-                <a:schemeClr val="accent1">
-                  <a:lumMod val="75000"/>
-                </a:schemeClr>
-              </a:buClr>
-              <a:buSzPct val="100000"/>
-              <a:buFont typeface="Arial" pitchFamily="34" charset="0"/>
-              <a:buChar char="▪"/>
-              <a:defRPr sz="1800" kern="1200">
-                <a:solidFill>
-                  <a:schemeClr val="tx1"/>
-                </a:solidFill>
-                <a:latin typeface="맑은 고딕" panose="020B0503020000020004" pitchFamily="50" charset="-127"/>
-                <a:ea typeface="맑은 고딕" panose="020B0503020000020004" pitchFamily="50" charset="-127"/>
-                <a:cs typeface="+mn-cs"/>
-              </a:defRPr>
-            </a:lvl2pPr>
-            <a:lvl3pPr marL="685800" indent="-179388" algn="l" defTabSz="914400" rtl="0" eaLnBrk="1" latinLnBrk="1" hangingPunct="1">
-              <a:lnSpc>
-                <a:spcPct val="90000"/>
-              </a:lnSpc>
-              <a:spcBef>
-                <a:spcPts val="800"/>
-              </a:spcBef>
-              <a:buClr>
-                <a:schemeClr val="accent1">
-                  <a:lumMod val="75000"/>
-                </a:schemeClr>
-              </a:buClr>
-              <a:buSzPct val="100000"/>
-              <a:buFont typeface="Arial" pitchFamily="34" charset="0"/>
-              <a:buChar char="▪"/>
-              <a:defRPr sz="1600" kern="1200">
-                <a:solidFill>
-                  <a:schemeClr val="tx1"/>
-                </a:solidFill>
-                <a:latin typeface="맑은 고딕" panose="020B0503020000020004" pitchFamily="50" charset="-127"/>
-                <a:ea typeface="맑은 고딕" panose="020B0503020000020004" pitchFamily="50" charset="-127"/>
-                <a:cs typeface="+mn-cs"/>
-              </a:defRPr>
-            </a:lvl3pPr>
-            <a:lvl4pPr marL="914400" indent="-182880" algn="l" defTabSz="914400" rtl="0" eaLnBrk="1" latinLnBrk="1" hangingPunct="1">
-              <a:lnSpc>
-                <a:spcPct val="90000"/>
-              </a:lnSpc>
-              <a:spcBef>
-                <a:spcPts val="800"/>
-              </a:spcBef>
-              <a:buClr>
-                <a:schemeClr val="accent1">
-                  <a:lumMod val="75000"/>
-                </a:schemeClr>
-              </a:buClr>
-              <a:buSzPct val="100000"/>
-              <a:buFont typeface="Arial" pitchFamily="34" charset="0"/>
-              <a:buChar char="▪"/>
-              <a:defRPr sz="1400" kern="1200">
-                <a:solidFill>
-                  <a:schemeClr val="tx1"/>
-                </a:solidFill>
-                <a:latin typeface="맑은 고딕" panose="020B0503020000020004" pitchFamily="50" charset="-127"/>
-                <a:ea typeface="맑은 고딕" panose="020B0503020000020004" pitchFamily="50" charset="-127"/>
-                <a:cs typeface="+mn-cs"/>
-              </a:defRPr>
-            </a:lvl4pPr>
-            <a:lvl5pPr marL="1143000" indent="-179388" algn="l" defTabSz="914400" rtl="0" eaLnBrk="1" latinLnBrk="1" hangingPunct="1">
-              <a:lnSpc>
-                <a:spcPct val="90000"/>
-              </a:lnSpc>
-              <a:spcBef>
-                <a:spcPts val="600"/>
-              </a:spcBef>
-              <a:buClr>
-                <a:schemeClr val="accent1">
-                  <a:lumMod val="75000"/>
-                </a:schemeClr>
-              </a:buClr>
-              <a:buSzPct val="100000"/>
-              <a:buFont typeface="Arial" pitchFamily="34" charset="0"/>
-              <a:buChar char="▪"/>
-              <a:defRPr sz="1400" kern="1200">
-                <a:solidFill>
-                  <a:schemeClr val="tx1"/>
-                </a:solidFill>
-                <a:latin typeface="맑은 고딕" panose="020B0503020000020004" pitchFamily="50" charset="-127"/>
-                <a:ea typeface="맑은 고딕" panose="020B0503020000020004" pitchFamily="50" charset="-127"/>
-                <a:cs typeface="+mn-cs"/>
-              </a:defRPr>
-            </a:lvl5pPr>
-            <a:lvl6pPr marL="1371600" indent="-182880" algn="l" defTabSz="914400" rtl="0" eaLnBrk="1" latinLnBrk="1" hangingPunct="1">
-              <a:lnSpc>
-                <a:spcPct val="90000"/>
-              </a:lnSpc>
-              <a:spcBef>
-                <a:spcPts val="600"/>
-              </a:spcBef>
-              <a:buClr>
-                <a:schemeClr val="accent1">
-                  <a:lumMod val="75000"/>
-                </a:schemeClr>
-              </a:buClr>
-              <a:buSzPct val="100000"/>
-              <a:buFont typeface="Arial" pitchFamily="34" charset="0"/>
-              <a:buChar char="▪"/>
-              <a:defRPr sz="1800" kern="1200">
-                <a:solidFill>
-                  <a:schemeClr val="tx1"/>
-                </a:solidFill>
-                <a:latin typeface="+mn-lt"/>
-                <a:ea typeface="+mn-ea"/>
-                <a:cs typeface="+mn-cs"/>
-              </a:defRPr>
-            </a:lvl6pPr>
-            <a:lvl7pPr marL="1600200" indent="-179388" algn="l" defTabSz="914400" rtl="0" eaLnBrk="1" latinLnBrk="1" hangingPunct="1">
-              <a:lnSpc>
-                <a:spcPct val="90000"/>
-              </a:lnSpc>
-              <a:spcBef>
-                <a:spcPts val="600"/>
-              </a:spcBef>
-              <a:buClr>
-                <a:schemeClr val="accent1">
-                  <a:lumMod val="75000"/>
-                </a:schemeClr>
-              </a:buClr>
-              <a:buSzPct val="100000"/>
-              <a:buFont typeface="Arial" pitchFamily="34" charset="0"/>
-              <a:buChar char="▪"/>
-              <a:defRPr sz="1800" kern="1200">
-                <a:solidFill>
-                  <a:schemeClr val="tx1"/>
-                </a:solidFill>
-                <a:latin typeface="+mn-lt"/>
-                <a:ea typeface="+mn-ea"/>
-                <a:cs typeface="+mn-cs"/>
-              </a:defRPr>
-            </a:lvl7pPr>
-            <a:lvl8pPr marL="1828800" indent="-182880" algn="l" defTabSz="914400" rtl="0" eaLnBrk="1" latinLnBrk="1" hangingPunct="1">
-              <a:lnSpc>
-                <a:spcPct val="90000"/>
-              </a:lnSpc>
-              <a:spcBef>
-                <a:spcPts val="600"/>
-              </a:spcBef>
-              <a:buClr>
-                <a:schemeClr val="accent1">
-                  <a:lumMod val="75000"/>
-                </a:schemeClr>
-              </a:buClr>
-              <a:buSzPct val="100000"/>
-              <a:buFont typeface="Arial" pitchFamily="34" charset="0"/>
-              <a:buChar char="▪"/>
-              <a:defRPr sz="1800" kern="1200">
-                <a:solidFill>
-                  <a:schemeClr val="tx1"/>
-                </a:solidFill>
-                <a:latin typeface="+mn-lt"/>
-                <a:ea typeface="+mn-ea"/>
-                <a:cs typeface="+mn-cs"/>
-              </a:defRPr>
-            </a:lvl8pPr>
-            <a:lvl9pPr marL="1878012" indent="0" algn="l" defTabSz="914400" rtl="0" eaLnBrk="1" latinLnBrk="1" hangingPunct="1">
-              <a:lnSpc>
-                <a:spcPct val="90000"/>
-              </a:lnSpc>
-              <a:spcBef>
-                <a:spcPts val="600"/>
-              </a:spcBef>
-              <a:buClr>
-                <a:schemeClr val="accent1">
-                  <a:lumMod val="75000"/>
-                </a:schemeClr>
-              </a:buClr>
-              <a:buSzPct val="100000"/>
-              <a:buFont typeface="Arial" pitchFamily="34" charset="0"/>
-              <a:buNone/>
-              <a:defRPr sz="1800" kern="1200">
-                <a:solidFill>
-                  <a:schemeClr val="tx1"/>
-                </a:solidFill>
-                <a:latin typeface="+mn-lt"/>
-                <a:ea typeface="+mn-ea"/>
-                <a:cs typeface="+mn-cs"/>
-              </a:defRPr>
-            </a:lvl9pPr>
-          </a:lstStyle>
-          <a:p>
-            <a:pPr marL="0" indent="0">
-              <a:buFont typeface="Arial" pitchFamily="34" charset="0"/>
-              <a:buNone/>
-            </a:pPr>
-            <a:r>
-              <a:rPr lang="en-US" altLang="ko-KR" sz="1500" dirty="0"/>
-              <a:t>Direct3D API</a:t>
-            </a:r>
-            <a:r>
-              <a:rPr lang="ko-KR" altLang="en-US" sz="1500" dirty="0"/>
-              <a:t>에선 완전한 </a:t>
-            </a:r>
-            <a:r>
-              <a:rPr lang="ko-KR" altLang="en-US" sz="1500" dirty="0" err="1"/>
-              <a:t>밉맵</a:t>
-            </a:r>
-            <a:r>
-              <a:rPr lang="ko-KR" altLang="en-US" sz="1500" dirty="0"/>
-              <a:t> 사슬을 가진 하나의 텍스처를 </a:t>
-            </a:r>
-            <a:r>
-              <a:rPr lang="ko-KR" altLang="en-US" sz="1500" b="1" dirty="0"/>
-              <a:t>배열 조각</a:t>
-            </a:r>
-            <a:r>
-              <a:rPr lang="en-US" altLang="ko-KR" sz="1500" b="1" dirty="0"/>
-              <a:t>(array slice)</a:t>
-            </a:r>
-            <a:r>
-              <a:rPr lang="ko-KR" altLang="en-US" sz="1500" dirty="0"/>
-              <a:t>라 하고</a:t>
-            </a:r>
-            <a:r>
-              <a:rPr lang="en-US" altLang="ko-KR" sz="1500" dirty="0"/>
-              <a:t>, </a:t>
-            </a:r>
-            <a:r>
-              <a:rPr lang="ko-KR" altLang="en-US" sz="1500" dirty="0"/>
-              <a:t>텍스처 배열의 모든 텍스처의 </a:t>
-            </a:r>
-            <a:r>
-              <a:rPr lang="ko-KR" altLang="en-US" sz="1500" dirty="0" err="1"/>
-              <a:t>밉맵</a:t>
-            </a:r>
-            <a:r>
-              <a:rPr lang="ko-KR" altLang="en-US" sz="1500" dirty="0"/>
-              <a:t> 사슬 중 한 수준의 </a:t>
-            </a:r>
-            <a:r>
-              <a:rPr lang="ko-KR" altLang="en-US" sz="1500" dirty="0" err="1"/>
-              <a:t>밉맵들</a:t>
-            </a:r>
-            <a:r>
-              <a:rPr lang="ko-KR" altLang="en-US" sz="1500" dirty="0"/>
-              <a:t> 전체를 </a:t>
-            </a:r>
-            <a:r>
-              <a:rPr lang="ko-KR" altLang="en-US" sz="1500" b="1" dirty="0"/>
-              <a:t>밉 조각</a:t>
-            </a:r>
-            <a:r>
-              <a:rPr lang="en-US" altLang="ko-KR" sz="1500" b="1" dirty="0"/>
-              <a:t>(</a:t>
-            </a:r>
-            <a:r>
-              <a:rPr lang="en-US" altLang="ko-KR" sz="1500" b="1" dirty="0" err="1"/>
-              <a:t>mip</a:t>
-            </a:r>
-            <a:r>
-              <a:rPr lang="en-US" altLang="ko-KR" sz="1500" b="1" dirty="0"/>
-              <a:t> slice)</a:t>
-            </a:r>
-            <a:r>
-              <a:rPr lang="ko-KR" altLang="en-US" sz="1500" dirty="0"/>
-              <a:t>라 한다</a:t>
-            </a:r>
-            <a:r>
-              <a:rPr lang="en-US" altLang="ko-KR" sz="1500" dirty="0"/>
-              <a:t>.</a:t>
-            </a:r>
-          </a:p>
-          <a:p>
-            <a:pPr marL="0" indent="0">
-              <a:buFont typeface="Arial" pitchFamily="34" charset="0"/>
-              <a:buNone/>
-            </a:pPr>
-            <a:r>
-              <a:rPr lang="ko-KR" altLang="en-US" sz="1500" dirty="0"/>
-              <a:t>이 텍스처 배열의 한 원소의 특정 </a:t>
-            </a:r>
-            <a:r>
-              <a:rPr lang="ko-KR" altLang="en-US" sz="1500" dirty="0" err="1"/>
-              <a:t>밉맵</a:t>
-            </a:r>
-            <a:r>
-              <a:rPr lang="ko-KR" altLang="en-US" sz="1500" dirty="0"/>
-              <a:t> 수준 하나를 </a:t>
-            </a:r>
-            <a:r>
-              <a:rPr lang="ko-KR" altLang="en-US" sz="1500" b="1" dirty="0"/>
-              <a:t>부분 자원</a:t>
-            </a:r>
-            <a:r>
-              <a:rPr lang="en-US" altLang="ko-KR" sz="1500" b="1" dirty="0"/>
-              <a:t>(</a:t>
-            </a:r>
-            <a:r>
-              <a:rPr lang="en-US" altLang="ko-KR" sz="1500" b="1" dirty="0" err="1"/>
-              <a:t>subresource</a:t>
-            </a:r>
-            <a:r>
-              <a:rPr lang="en-US" altLang="ko-KR" sz="1500" b="1" dirty="0"/>
-              <a:t>)</a:t>
-            </a:r>
-            <a:r>
-              <a:rPr lang="ko-KR" altLang="en-US" sz="1500" dirty="0"/>
-              <a:t>이라 한다</a:t>
-            </a:r>
-            <a:r>
-              <a:rPr lang="en-US" altLang="ko-KR" sz="1500" dirty="0"/>
-              <a:t>.</a:t>
-            </a:r>
-          </a:p>
-          <a:p>
-            <a:pPr marL="0" indent="0">
-              <a:buFont typeface="Arial" pitchFamily="34" charset="0"/>
-              <a:buNone/>
-            </a:pPr>
-            <a:r>
-              <a:rPr lang="en-US" altLang="ko-KR" sz="1500" dirty="0"/>
-              <a:t>※ </a:t>
-            </a:r>
-            <a:r>
-              <a:rPr lang="ko-KR" altLang="en-US" sz="1500" dirty="0"/>
-              <a:t>하나의 선형적인</a:t>
-            </a:r>
-            <a:r>
-              <a:rPr lang="en-US" altLang="ko-KR" sz="1500" dirty="0"/>
-              <a:t>(1</a:t>
-            </a:r>
-            <a:r>
-              <a:rPr lang="ko-KR" altLang="en-US" sz="1500" dirty="0"/>
-              <a:t>차원</a:t>
-            </a:r>
-            <a:r>
-              <a:rPr lang="en-US" altLang="ko-KR" sz="1500" dirty="0"/>
-              <a:t>) </a:t>
-            </a:r>
-            <a:r>
-              <a:rPr lang="ko-KR" altLang="en-US" sz="1500" dirty="0"/>
-              <a:t>색인을 이용해 특정 부분자원에 접근하는 것도 가능 </a:t>
-            </a:r>
-            <a:r>
-              <a:rPr lang="en-US" altLang="ko-KR" sz="1500" dirty="0"/>
-              <a:t>(2</a:t>
-            </a:r>
-            <a:r>
-              <a:rPr lang="ko-KR" altLang="en-US" sz="1500" dirty="0"/>
-              <a:t>번째 그림</a:t>
-            </a:r>
-            <a:r>
-              <a:rPr lang="en-US" altLang="ko-KR" sz="1500" dirty="0"/>
-              <a:t>)</a:t>
-            </a:r>
-          </a:p>
-        </p:txBody>
-      </p:sp>
-      <p:pic>
-        <p:nvPicPr>
-          <p:cNvPr id="12" name="그림 11">
-            <a:extLst>
-              <a:ext uri="{FF2B5EF4-FFF2-40B4-BE49-F238E27FC236}">
-                <a16:creationId xmlns:a16="http://schemas.microsoft.com/office/drawing/2014/main" id="{02641323-CAC3-44AA-A208-2FB1CE6F82D7}"/>
-              </a:ext>
-            </a:extLst>
-          </p:cNvPr>
-          <p:cNvPicPr>
-            <a:picLocks noChangeAspect="1"/>
-          </p:cNvPicPr>
-          <p:nvPr/>
-        </p:nvPicPr>
-        <p:blipFill>
-          <a:blip r:embed="rId3"/>
-          <a:stretch>
-            <a:fillRect/>
-          </a:stretch>
-        </p:blipFill>
-        <p:spPr>
-          <a:xfrm>
-            <a:off x="696873" y="3417609"/>
-            <a:ext cx="3805365" cy="2618055"/>
-          </a:xfrm>
-          <a:prstGeom prst="rect">
-            <a:avLst/>
-          </a:prstGeom>
-        </p:spPr>
-      </p:pic>
-      <p:pic>
-        <p:nvPicPr>
-          <p:cNvPr id="14" name="그림 13">
-            <a:extLst>
-              <a:ext uri="{FF2B5EF4-FFF2-40B4-BE49-F238E27FC236}">
-                <a16:creationId xmlns:a16="http://schemas.microsoft.com/office/drawing/2014/main" id="{68ED1F3D-A146-47A5-9CEB-813A83DB5CE1}"/>
-              </a:ext>
-            </a:extLst>
-          </p:cNvPr>
-          <p:cNvPicPr>
-            <a:picLocks noChangeAspect="1"/>
-          </p:cNvPicPr>
-          <p:nvPr/>
-        </p:nvPicPr>
-        <p:blipFill>
-          <a:blip r:embed="rId4"/>
-          <a:stretch>
-            <a:fillRect/>
-          </a:stretch>
-        </p:blipFill>
-        <p:spPr>
-          <a:xfrm>
-            <a:off x="6053469" y="3573165"/>
-            <a:ext cx="4655488" cy="2213415"/>
-          </a:xfrm>
-          <a:prstGeom prst="rect">
-            <a:avLst/>
-          </a:prstGeom>
-        </p:spPr>
-      </p:pic>
-    </p:spTree>
-    <p:extLst>
-      <p:ext uri="{BB962C8B-B14F-4D97-AF65-F5344CB8AC3E}">
-        <p14:creationId xmlns:p14="http://schemas.microsoft.com/office/powerpoint/2010/main" val="967644129"/>
       </p:ext>
     </p:extLst>
   </p:cSld>

</xml_diff>

<commit_message>
00:19 Chapter 16 Instancing and Frustum Culling
</commit_message>
<xml_diff>
--- a/Common/Chapter13 CS.pptx
+++ b/Common/Chapter13 CS.pptx
@@ -25360,11 +25360,19 @@
             </a:r>
             <a:r>
               <a:rPr lang="ko-KR" altLang="en-US" dirty="0" smtClean="0"/>
-              <a:t>파이프라인에 직접 포함</a:t>
+              <a:t>파이프라인에 직접 </a:t>
+            </a:r>
+            <a:r>
+              <a:rPr lang="ko-KR" altLang="en-US" dirty="0" smtClean="0"/>
+              <a:t>포함</a:t>
+            </a:r>
+            <a:r>
+              <a:rPr lang="en-US" altLang="ko-KR" dirty="0"/>
+              <a:t>(</a:t>
             </a:r>
             <a:r>
               <a:rPr lang="en-US" altLang="ko-KR" dirty="0" smtClean="0"/>
-              <a:t>X </a:t>
+              <a:t>X) </a:t>
             </a:r>
             <a:r>
               <a:rPr lang="ko-KR" altLang="en-US" dirty="0" smtClean="0"/>
@@ -25400,7 +25408,11 @@
             </a:r>
             <a:r>
               <a:rPr lang="ko-KR" altLang="en-US" dirty="0" smtClean="0"/>
-              <a:t>자운에 직접 자료를 기록 가능</a:t>
+              <a:t>자원에 </a:t>
+            </a:r>
+            <a:r>
+              <a:rPr lang="ko-KR" altLang="en-US" dirty="0" smtClean="0"/>
+              <a:t>직접 자료를 기록 가능</a:t>
             </a:r>
             <a:endParaRPr lang="en-US" altLang="ko-KR" dirty="0" smtClean="0"/>
           </a:p>

</xml_diff>